<commit_message>
Apply offline review comments
</commit_message>
<xml_diff>
--- a/08_iterators/08_iterators.pptx
+++ b/08_iterators/08_iterators.pptx
@@ -223,7 +223,7 @@
           <a:p>
             <a:fld id="{5BD5B299-94C6-402B-8FE2-93C183F604B2}" type="datetimeFigureOut">
               <a:rPr lang="en-US" smtClean="0"/>
-              <a:t>11/10/2020</a:t>
+              <a:t>12/29/2020</a:t>
             </a:fld>
             <a:endParaRPr lang="en-US"/>
           </a:p>
@@ -2931,7 +2931,7 @@
           <a:p>
             <a:fld id="{947EF2C3-E71D-4F8D-9558-45572174E304}" type="datetimeFigureOut">
               <a:rPr lang="en-US" smtClean="0"/>
-              <a:t>11/10/2020</a:t>
+              <a:t>12/29/2020</a:t>
             </a:fld>
             <a:endParaRPr lang="en-US"/>
           </a:p>
@@ -3129,7 +3129,7 @@
           <a:p>
             <a:fld id="{947EF2C3-E71D-4F8D-9558-45572174E304}" type="datetimeFigureOut">
               <a:rPr lang="en-US" smtClean="0"/>
-              <a:t>11/10/2020</a:t>
+              <a:t>12/29/2020</a:t>
             </a:fld>
             <a:endParaRPr lang="en-US"/>
           </a:p>
@@ -3337,7 +3337,7 @@
           <a:p>
             <a:fld id="{947EF2C3-E71D-4F8D-9558-45572174E304}" type="datetimeFigureOut">
               <a:rPr lang="en-US" smtClean="0"/>
-              <a:t>11/10/2020</a:t>
+              <a:t>12/29/2020</a:t>
             </a:fld>
             <a:endParaRPr lang="en-US"/>
           </a:p>
@@ -3535,7 +3535,7 @@
           <a:p>
             <a:fld id="{947EF2C3-E71D-4F8D-9558-45572174E304}" type="datetimeFigureOut">
               <a:rPr lang="en-US" smtClean="0"/>
-              <a:t>11/10/2020</a:t>
+              <a:t>12/29/2020</a:t>
             </a:fld>
             <a:endParaRPr lang="en-US"/>
           </a:p>
@@ -3810,7 +3810,7 @@
           <a:p>
             <a:fld id="{947EF2C3-E71D-4F8D-9558-45572174E304}" type="datetimeFigureOut">
               <a:rPr lang="en-US" smtClean="0"/>
-              <a:t>11/10/2020</a:t>
+              <a:t>12/29/2020</a:t>
             </a:fld>
             <a:endParaRPr lang="en-US"/>
           </a:p>
@@ -4075,7 +4075,7 @@
           <a:p>
             <a:fld id="{947EF2C3-E71D-4F8D-9558-45572174E304}" type="datetimeFigureOut">
               <a:rPr lang="en-US" smtClean="0"/>
-              <a:t>11/10/2020</a:t>
+              <a:t>12/29/2020</a:t>
             </a:fld>
             <a:endParaRPr lang="en-US"/>
           </a:p>
@@ -4487,7 +4487,7 @@
           <a:p>
             <a:fld id="{947EF2C3-E71D-4F8D-9558-45572174E304}" type="datetimeFigureOut">
               <a:rPr lang="en-US" smtClean="0"/>
-              <a:t>11/10/2020</a:t>
+              <a:t>12/29/2020</a:t>
             </a:fld>
             <a:endParaRPr lang="en-US"/>
           </a:p>
@@ -4628,7 +4628,7 @@
           <a:p>
             <a:fld id="{947EF2C3-E71D-4F8D-9558-45572174E304}" type="datetimeFigureOut">
               <a:rPr lang="en-US" smtClean="0"/>
-              <a:t>11/10/2020</a:t>
+              <a:t>12/29/2020</a:t>
             </a:fld>
             <a:endParaRPr lang="en-US"/>
           </a:p>
@@ -4741,7 +4741,7 @@
           <a:p>
             <a:fld id="{947EF2C3-E71D-4F8D-9558-45572174E304}" type="datetimeFigureOut">
               <a:rPr lang="en-US" smtClean="0"/>
-              <a:t>11/10/2020</a:t>
+              <a:t>12/29/2020</a:t>
             </a:fld>
             <a:endParaRPr lang="en-US"/>
           </a:p>
@@ -5052,7 +5052,7 @@
           <a:p>
             <a:fld id="{947EF2C3-E71D-4F8D-9558-45572174E304}" type="datetimeFigureOut">
               <a:rPr lang="en-US" smtClean="0"/>
-              <a:t>11/10/2020</a:t>
+              <a:t>12/29/2020</a:t>
             </a:fld>
             <a:endParaRPr lang="en-US"/>
           </a:p>
@@ -5340,7 +5340,7 @@
           <a:p>
             <a:fld id="{947EF2C3-E71D-4F8D-9558-45572174E304}" type="datetimeFigureOut">
               <a:rPr lang="en-US" smtClean="0"/>
-              <a:t>11/10/2020</a:t>
+              <a:t>12/29/2020</a:t>
             </a:fld>
             <a:endParaRPr lang="en-US"/>
           </a:p>
@@ -5581,7 +5581,7 @@
           <a:p>
             <a:fld id="{947EF2C3-E71D-4F8D-9558-45572174E304}" type="datetimeFigureOut">
               <a:rPr lang="en-US" smtClean="0"/>
-              <a:t>11/10/2020</a:t>
+              <a:t>12/29/2020</a:t>
             </a:fld>
             <a:endParaRPr lang="en-US"/>
           </a:p>
@@ -6759,7 +6759,7 @@
         </p:nvSpPr>
         <p:spPr>
           <a:xfrm>
-            <a:off x="5887235" y="2011722"/>
+            <a:off x="6084804" y="1996936"/>
             <a:ext cx="4368800" cy="2563621"/>
           </a:xfrm>
           <a:prstGeom prst="rect">
@@ -6911,10 +6911,6 @@
             </a:lvl9pPr>
           </a:lstStyle>
           <a:p>
-            <a:pPr marL="457189" indent="-457189">
-              <a:buFont typeface="Arial" panose="020B0604020202020204" pitchFamily="34" charset="0"/>
-              <a:buChar char="•"/>
-            </a:pPr>
             <a:r>
               <a:rPr lang="en-US" sz="2800" dirty="0" err="1">
                 <a:ea typeface="Intel Clear Light" panose="020B0404020203020204" pitchFamily="34" charset="0"/>
@@ -6957,8 +6953,8 @@
         </p:nvSpPr>
         <p:spPr>
           <a:xfrm>
-            <a:off x="948268" y="2011722"/>
-            <a:ext cx="4368800" cy="2563621"/>
+            <a:off x="1805003" y="2011722"/>
+            <a:ext cx="4368800" cy="4496170"/>
           </a:xfrm>
           <a:prstGeom prst="rect">
             <a:avLst/>
@@ -7109,10 +7105,6 @@
             </a:lvl9pPr>
           </a:lstStyle>
           <a:p>
-            <a:pPr marL="457189" indent="-457189">
-              <a:buFont typeface="Arial" panose="020B0604020202020204" pitchFamily="34" charset="0"/>
-              <a:buChar char="•"/>
-            </a:pPr>
             <a:r>
               <a:rPr lang="en-US" sz="2800" dirty="0" err="1">
                 <a:ea typeface="Intel Clear Light" panose="020B0404020203020204" pitchFamily="34" charset="0"/>
@@ -7126,33 +7118,18 @@
             </a:endParaRPr>
           </a:p>
           <a:p>
-            <a:pPr marL="457189" indent="-457189">
-              <a:buFont typeface="Arial" panose="020B0604020202020204" pitchFamily="34" charset="0"/>
-              <a:buChar char="•"/>
-            </a:pPr>
-            <a:r>
-              <a:rPr lang="en-US" sz="2800" dirty="0" err="1">
-                <a:ea typeface="Intel Clear Light" panose="020B0404020203020204" pitchFamily="34" charset="0"/>
-                <a:cs typeface="Intel Clear Light" panose="020B0404020203020204" pitchFamily="34" charset="0"/>
-              </a:rPr>
-              <a:t>ForwardIterator</a:t>
-            </a:r>
             <a:endParaRPr lang="en-US" sz="2800" dirty="0">
               <a:ea typeface="Intel Clear Light" panose="020B0404020203020204" pitchFamily="34" charset="0"/>
               <a:cs typeface="Intel Clear Light" panose="020B0404020203020204" pitchFamily="34" charset="0"/>
             </a:endParaRPr>
           </a:p>
           <a:p>
-            <a:pPr marL="457189" indent="-457189">
-              <a:buFont typeface="Arial" panose="020B0604020202020204" pitchFamily="34" charset="0"/>
-              <a:buChar char="•"/>
-            </a:pPr>
             <a:r>
               <a:rPr lang="en-US" sz="2800" dirty="0" err="1">
                 <a:ea typeface="Intel Clear Light" panose="020B0404020203020204" pitchFamily="34" charset="0"/>
                 <a:cs typeface="Intel Clear Light" panose="020B0404020203020204" pitchFamily="34" charset="0"/>
               </a:rPr>
-              <a:t>BidirectionalIterator</a:t>
+              <a:t>ForwardIterator</a:t>
             </a:r>
             <a:endParaRPr lang="en-US" sz="2800" dirty="0">
               <a:ea typeface="Intel Clear Light" panose="020B0404020203020204" pitchFamily="34" charset="0"/>
@@ -7160,10 +7137,31 @@
             </a:endParaRPr>
           </a:p>
           <a:p>
-            <a:pPr marL="457189" indent="-457189">
-              <a:buFont typeface="Arial" panose="020B0604020202020204" pitchFamily="34" charset="0"/>
-              <a:buChar char="•"/>
-            </a:pPr>
+            <a:endParaRPr lang="en-US" sz="2800" dirty="0">
+              <a:ea typeface="Intel Clear Light" panose="020B0404020203020204" pitchFamily="34" charset="0"/>
+              <a:cs typeface="Intel Clear Light" panose="020B0404020203020204" pitchFamily="34" charset="0"/>
+            </a:endParaRPr>
+          </a:p>
+          <a:p>
+            <a:r>
+              <a:rPr lang="en-US" sz="2800" dirty="0" err="1">
+                <a:ea typeface="Intel Clear Light" panose="020B0404020203020204" pitchFamily="34" charset="0"/>
+                <a:cs typeface="Intel Clear Light" panose="020B0404020203020204" pitchFamily="34" charset="0"/>
+              </a:rPr>
+              <a:t>BidirectionalIterator</a:t>
+            </a:r>
+            <a:endParaRPr lang="en-US" sz="2800" dirty="0">
+              <a:ea typeface="Intel Clear Light" panose="020B0404020203020204" pitchFamily="34" charset="0"/>
+              <a:cs typeface="Intel Clear Light" panose="020B0404020203020204" pitchFamily="34" charset="0"/>
+            </a:endParaRPr>
+          </a:p>
+          <a:p>
+            <a:endParaRPr lang="en-US" sz="2800" dirty="0">
+              <a:ea typeface="Intel Clear Light" panose="020B0404020203020204" pitchFamily="34" charset="0"/>
+              <a:cs typeface="Intel Clear Light" panose="020B0404020203020204" pitchFamily="34" charset="0"/>
+            </a:endParaRPr>
+          </a:p>
+          <a:p>
             <a:r>
               <a:rPr lang="en-US" sz="2800" dirty="0" err="1">
                 <a:ea typeface="Intel Clear Light" panose="020B0404020203020204" pitchFamily="34" charset="0"/>
@@ -7240,13 +7238,15 @@
               </a:ext>
             </a:extLst>
           </p:cNvPr>
-          <p:cNvCxnSpPr/>
+          <p:cNvCxnSpPr>
+            <a:cxnSpLocks/>
+          </p:cNvCxnSpPr>
           <p:nvPr/>
         </p:nvCxnSpPr>
         <p:spPr>
-          <a:xfrm flipH="1">
-            <a:off x="3766159" y="1561579"/>
-            <a:ext cx="784964" cy="450143"/>
+          <a:xfrm flipV="1">
+            <a:off x="3278659" y="1369139"/>
+            <a:ext cx="1260390" cy="586506"/>
           </a:xfrm>
           <a:prstGeom prst="straightConnector1">
             <a:avLst/>
@@ -7285,14 +7285,177 @@
           <p:nvPr/>
         </p:nvCxnSpPr>
         <p:spPr>
-          <a:xfrm>
-            <a:off x="6510522" y="1561579"/>
-            <a:ext cx="728825" cy="450143"/>
+          <a:xfrm flipH="1" flipV="1">
+            <a:off x="6173804" y="1423037"/>
+            <a:ext cx="1124920" cy="532608"/>
           </a:xfrm>
           <a:prstGeom prst="straightConnector1">
             <a:avLst/>
           </a:prstGeom>
           <a:ln>
+            <a:tailEnd type="triangle"/>
+          </a:ln>
+        </p:spPr>
+        <p:style>
+          <a:lnRef idx="1">
+            <a:schemeClr val="accent1"/>
+          </a:lnRef>
+          <a:fillRef idx="0">
+            <a:schemeClr val="accent1"/>
+          </a:fillRef>
+          <a:effectRef idx="0">
+            <a:schemeClr val="accent1"/>
+          </a:effectRef>
+          <a:fontRef idx="minor">
+            <a:schemeClr val="tx1"/>
+          </a:fontRef>
+        </p:style>
+      </p:cxnSp>
+      <p:cxnSp>
+        <p:nvCxnSpPr>
+          <p:cNvPr id="13" name="Straight Arrow Connector 12">
+            <a:extLst>
+              <a:ext uri="{FF2B5EF4-FFF2-40B4-BE49-F238E27FC236}">
+                <a16:creationId xmlns:a16="http://schemas.microsoft.com/office/drawing/2014/main" id="{3857EF3A-0ED9-4375-8519-BB7A8A5E4393}"/>
+              </a:ext>
+            </a:extLst>
+          </p:cNvPr>
+          <p:cNvCxnSpPr>
+            <a:cxnSpLocks/>
+          </p:cNvCxnSpPr>
+          <p:nvPr/>
+        </p:nvCxnSpPr>
+        <p:spPr>
+          <a:xfrm flipV="1">
+            <a:off x="2765263" y="2487828"/>
+            <a:ext cx="0" cy="617924"/>
+          </a:xfrm>
+          <a:prstGeom prst="straightConnector1">
+            <a:avLst/>
+          </a:prstGeom>
+          <a:ln>
+            <a:tailEnd type="triangle"/>
+          </a:ln>
+        </p:spPr>
+        <p:style>
+          <a:lnRef idx="1">
+            <a:schemeClr val="accent1"/>
+          </a:lnRef>
+          <a:fillRef idx="0">
+            <a:schemeClr val="accent1"/>
+          </a:fillRef>
+          <a:effectRef idx="0">
+            <a:schemeClr val="accent1"/>
+          </a:effectRef>
+          <a:fontRef idx="minor">
+            <a:schemeClr val="tx1"/>
+          </a:fontRef>
+        </p:style>
+      </p:cxnSp>
+      <p:cxnSp>
+        <p:nvCxnSpPr>
+          <p:cNvPr id="20" name="Straight Arrow Connector 19">
+            <a:extLst>
+              <a:ext uri="{FF2B5EF4-FFF2-40B4-BE49-F238E27FC236}">
+                <a16:creationId xmlns:a16="http://schemas.microsoft.com/office/drawing/2014/main" id="{FAED2B6D-C033-467F-9382-F28467590A32}"/>
+              </a:ext>
+            </a:extLst>
+          </p:cNvPr>
+          <p:cNvCxnSpPr>
+            <a:cxnSpLocks/>
+          </p:cNvCxnSpPr>
+          <p:nvPr/>
+        </p:nvCxnSpPr>
+        <p:spPr>
+          <a:xfrm flipV="1">
+            <a:off x="2765263" y="3716024"/>
+            <a:ext cx="0" cy="617924"/>
+          </a:xfrm>
+          <a:prstGeom prst="straightConnector1">
+            <a:avLst/>
+          </a:prstGeom>
+          <a:ln>
+            <a:tailEnd type="triangle"/>
+          </a:ln>
+        </p:spPr>
+        <p:style>
+          <a:lnRef idx="1">
+            <a:schemeClr val="accent1"/>
+          </a:lnRef>
+          <a:fillRef idx="0">
+            <a:schemeClr val="accent1"/>
+          </a:fillRef>
+          <a:effectRef idx="0">
+            <a:schemeClr val="accent1"/>
+          </a:effectRef>
+          <a:fontRef idx="minor">
+            <a:schemeClr val="tx1"/>
+          </a:fontRef>
+        </p:style>
+      </p:cxnSp>
+      <p:cxnSp>
+        <p:nvCxnSpPr>
+          <p:cNvPr id="21" name="Straight Arrow Connector 20">
+            <a:extLst>
+              <a:ext uri="{FF2B5EF4-FFF2-40B4-BE49-F238E27FC236}">
+                <a16:creationId xmlns:a16="http://schemas.microsoft.com/office/drawing/2014/main" id="{536E7AFD-B777-4CCE-A747-E892528C5245}"/>
+              </a:ext>
+            </a:extLst>
+          </p:cNvPr>
+          <p:cNvCxnSpPr>
+            <a:cxnSpLocks/>
+          </p:cNvCxnSpPr>
+          <p:nvPr/>
+        </p:nvCxnSpPr>
+        <p:spPr>
+          <a:xfrm flipV="1">
+            <a:off x="2766731" y="4889915"/>
+            <a:ext cx="0" cy="617924"/>
+          </a:xfrm>
+          <a:prstGeom prst="straightConnector1">
+            <a:avLst/>
+          </a:prstGeom>
+          <a:ln>
+            <a:tailEnd type="triangle"/>
+          </a:ln>
+        </p:spPr>
+        <p:style>
+          <a:lnRef idx="1">
+            <a:schemeClr val="accent1"/>
+          </a:lnRef>
+          <a:fillRef idx="0">
+            <a:schemeClr val="accent1"/>
+          </a:fillRef>
+          <a:effectRef idx="0">
+            <a:schemeClr val="accent1"/>
+          </a:effectRef>
+          <a:fontRef idx="minor">
+            <a:schemeClr val="tx1"/>
+          </a:fontRef>
+        </p:style>
+      </p:cxnSp>
+      <p:cxnSp>
+        <p:nvCxnSpPr>
+          <p:cNvPr id="26" name="Straight Arrow Connector 25">
+            <a:extLst>
+              <a:ext uri="{FF2B5EF4-FFF2-40B4-BE49-F238E27FC236}">
+                <a16:creationId xmlns:a16="http://schemas.microsoft.com/office/drawing/2014/main" id="{2BF1FAB2-70A1-4938-BC00-0A9118EBDED7}"/>
+              </a:ext>
+            </a:extLst>
+          </p:cNvPr>
+          <p:cNvCxnSpPr/>
+          <p:nvPr/>
+        </p:nvCxnSpPr>
+        <p:spPr>
+          <a:xfrm flipV="1">
+            <a:off x="4374292" y="2603157"/>
+            <a:ext cx="1710512" cy="757881"/>
+          </a:xfrm>
+          <a:prstGeom prst="straightConnector1">
+            <a:avLst/>
+          </a:prstGeom>
+          <a:ln>
+            <a:prstDash val="dash"/>
             <a:tailEnd type="triangle"/>
           </a:ln>
         </p:spPr>
@@ -7963,7 +8126,7 @@
                 <a:ea typeface="Intel Clear Light" panose="020B0404020203020204" pitchFamily="34" charset="0"/>
                 <a:cs typeface="Intel Clear Light" panose="020B0404020203020204" pitchFamily="34" charset="0"/>
               </a:rPr>
-              <a:t> should be an Iterator and define the following operations:</a:t>
+              <a:t> is an Iterator with the following operations defined:</a:t>
             </a:r>
           </a:p>
           <a:p>
@@ -8016,6 +8179,13 @@
           </a:p>
           <a:p>
             <a:r>
+              <a:rPr lang="en-US" sz="2800" b="1" dirty="0">
+                <a:ea typeface="Intel Clear Light" panose="020B0404020203020204" pitchFamily="34" charset="0"/>
+                <a:cs typeface="Intel Clear Light" panose="020B0404020203020204" pitchFamily="34" charset="0"/>
+              </a:rPr>
+              <a:t>After </a:t>
+            </a:r>
+            <a:r>
               <a:rPr lang="en-US" sz="2800" b="1" dirty="0" err="1">
                 <a:ea typeface="Intel Clear Light" panose="020B0404020203020204" pitchFamily="34" charset="0"/>
                 <a:cs typeface="Intel Clear Light" panose="020B0404020203020204" pitchFamily="34" charset="0"/>
@@ -8027,7 +8197,7 @@
                 <a:ea typeface="Intel Clear Light" panose="020B0404020203020204" pitchFamily="34" charset="0"/>
                 <a:cs typeface="Intel Clear Light" panose="020B0404020203020204" pitchFamily="34" charset="0"/>
               </a:rPr>
-              <a:t> can only be incremented once</a:t>
+              <a:t> incrementation all copies are invalidated</a:t>
             </a:r>
           </a:p>
           <a:p>
@@ -8333,7 +8503,7 @@
                 <a:ea typeface="Intel Clear Light" panose="020B0404020203020204" pitchFamily="34" charset="0"/>
                 <a:cs typeface="Intel Clear Light" panose="020B0404020203020204" pitchFamily="34" charset="0"/>
               </a:rPr>
-              <a:t> should be an </a:t>
+              <a:t> is an </a:t>
             </a:r>
             <a:r>
               <a:rPr lang="en-US" sz="2800" dirty="0" err="1">
@@ -8347,7 +8517,7 @@
                 <a:ea typeface="Intel Clear Light" panose="020B0404020203020204" pitchFamily="34" charset="0"/>
                 <a:cs typeface="Intel Clear Light" panose="020B0404020203020204" pitchFamily="34" charset="0"/>
               </a:rPr>
-              <a:t> and define the default constructor.</a:t>
+              <a:t> with the defined default constructor.</a:t>
             </a:r>
           </a:p>
           <a:p>
@@ -9440,7 +9610,7 @@
                 <a:ea typeface="Intel Clear Light" panose="020B0404020203020204" pitchFamily="34" charset="0"/>
                 <a:cs typeface="Intel Clear Light" panose="020B0404020203020204" pitchFamily="34" charset="0"/>
               </a:rPr>
-              <a:t> should be a </a:t>
+              <a:t> is a </a:t>
             </a:r>
             <a:r>
               <a:rPr lang="en-US" sz="2800" dirty="0" err="1">
@@ -9454,7 +9624,7 @@
                 <a:ea typeface="Intel Clear Light" panose="020B0404020203020204" pitchFamily="34" charset="0"/>
                 <a:cs typeface="Intel Clear Light" panose="020B0404020203020204" pitchFamily="34" charset="0"/>
               </a:rPr>
-              <a:t> and define the following operations:</a:t>
+              <a:t> with the following operations defined:</a:t>
             </a:r>
           </a:p>
           <a:p>
@@ -10408,7 +10578,7 @@
         <p:spPr>
           <a:xfrm>
             <a:off x="539749" y="1274310"/>
-            <a:ext cx="10594976" cy="4459741"/>
+            <a:ext cx="10594976" cy="4953495"/>
           </a:xfrm>
           <a:prstGeom prst="rect">
             <a:avLst/>
@@ -10578,7 +10748,7 @@
                 <a:ea typeface="Intel Clear Light" panose="020B0404020203020204" pitchFamily="34" charset="0"/>
                 <a:cs typeface="Intel Clear Light" panose="020B0404020203020204" pitchFamily="34" charset="0"/>
               </a:rPr>
-              <a:t> should be a </a:t>
+              <a:t> is a </a:t>
             </a:r>
             <a:r>
               <a:rPr lang="en-US" sz="2800" dirty="0" err="1">
@@ -10592,21 +10762,7 @@
                 <a:ea typeface="Intel Clear Light" panose="020B0404020203020204" pitchFamily="34" charset="0"/>
                 <a:cs typeface="Intel Clear Light" panose="020B0404020203020204" pitchFamily="34" charset="0"/>
               </a:rPr>
-              <a:t> and define the following operations (n is </a:t>
-            </a:r>
-            <a:r>
-              <a:rPr lang="en-US" sz="2800" b="1" dirty="0">
-                <a:ea typeface="Intel Clear Light" panose="020B0404020203020204" pitchFamily="34" charset="0"/>
-                <a:cs typeface="Intel Clear Light" panose="020B0404020203020204" pitchFamily="34" charset="0"/>
-              </a:rPr>
-              <a:t>signed </a:t>
-            </a:r>
-            <a:r>
-              <a:rPr lang="en-US" sz="2800" dirty="0">
-                <a:ea typeface="Intel Clear Light" panose="020B0404020203020204" pitchFamily="34" charset="0"/>
-                <a:cs typeface="Intel Clear Light" panose="020B0404020203020204" pitchFamily="34" charset="0"/>
-              </a:rPr>
-              <a:t>integer):</a:t>
+              <a:t> with the following operations defined:</a:t>
             </a:r>
           </a:p>
           <a:p>
@@ -10684,25 +10840,44 @@
                 <a:ea typeface="Intel Clear Light" panose="020B0404020203020204" pitchFamily="34" charset="0"/>
                 <a:cs typeface="Intel Clear Light" panose="020B0404020203020204" pitchFamily="34" charset="0"/>
               </a:rPr>
-              <a:t>it1 &lt; it2, it1 &gt; it2, it1 &lt;= it2, it1 &gt;= it2</a:t>
-            </a:r>
-          </a:p>
-          <a:p>
-            <a:pPr marL="1219170" lvl="2" indent="-457189">
-              <a:buFont typeface="Arial" panose="020B0604020202020204" pitchFamily="34" charset="0"/>
-              <a:buChar char="•"/>
-            </a:pPr>
-            <a:endParaRPr lang="en-US" sz="2533" i="1" dirty="0">
+              <a:t>it1 &lt; it2, it1 &gt; it2, it1 &lt;= it2, it1 &gt;= it</a:t>
+            </a:r>
+            <a:endParaRPr lang="en-US" sz="2933" i="1" dirty="0">
               <a:ea typeface="Intel Clear Light" panose="020B0404020203020204" pitchFamily="34" charset="0"/>
               <a:cs typeface="Intel Clear Light" panose="020B0404020203020204" pitchFamily="34" charset="0"/>
             </a:endParaRPr>
           </a:p>
           <a:p>
-            <a:pPr marL="1219170" lvl="2" indent="-457189">
-              <a:buFont typeface="Arial" panose="020B0604020202020204" pitchFamily="34" charset="0"/>
-              <a:buChar char="•"/>
-            </a:pPr>
-            <a:endParaRPr lang="en-US" sz="2533" dirty="0">
+            <a:r>
+              <a:rPr lang="en-US" sz="2400" dirty="0">
+                <a:ea typeface="Intel Clear Light" panose="020B0404020203020204" pitchFamily="34" charset="0"/>
+                <a:cs typeface="Intel Clear Light" panose="020B0404020203020204" pitchFamily="34" charset="0"/>
+              </a:rPr>
+              <a:t>where n is a </a:t>
+            </a:r>
+            <a:r>
+              <a:rPr lang="en-US" sz="2400" b="1" dirty="0">
+                <a:ea typeface="Intel Clear Light" panose="020B0404020203020204" pitchFamily="34" charset="0"/>
+                <a:cs typeface="Intel Clear Light" panose="020B0404020203020204" pitchFamily="34" charset="0"/>
+              </a:rPr>
+              <a:t>signed </a:t>
+            </a:r>
+            <a:r>
+              <a:rPr lang="en-US" sz="2400" dirty="0">
+                <a:ea typeface="Intel Clear Light" panose="020B0404020203020204" pitchFamily="34" charset="0"/>
+                <a:cs typeface="Intel Clear Light" panose="020B0404020203020204" pitchFamily="34" charset="0"/>
+              </a:rPr>
+              <a:t>integer</a:t>
+            </a:r>
+          </a:p>
+          <a:p>
+            <a:endParaRPr lang="en-US" sz="2400" dirty="0">
+              <a:ea typeface="Intel Clear Light" panose="020B0404020203020204" pitchFamily="34" charset="0"/>
+              <a:cs typeface="Intel Clear Light" panose="020B0404020203020204" pitchFamily="34" charset="0"/>
+            </a:endParaRPr>
+          </a:p>
+          <a:p>
+            <a:endParaRPr lang="en-US" sz="2733" dirty="0">
               <a:ea typeface="Intel Clear Light" panose="020B0404020203020204" pitchFamily="34" charset="0"/>
               <a:cs typeface="Intel Clear Light" panose="020B0404020203020204" pitchFamily="34" charset="0"/>
             </a:endParaRPr>
@@ -11792,7 +11967,7 @@
                 <a:ea typeface="Intel Clear Light" panose="020B0404020203020204" pitchFamily="34" charset="0"/>
                 <a:cs typeface="Intel Clear Light" panose="020B0404020203020204" pitchFamily="34" charset="0"/>
               </a:rPr>
-              <a:t> is </a:t>
+              <a:t> is an </a:t>
             </a:r>
             <a:r>
               <a:rPr lang="en-US" sz="2800" dirty="0" err="1">
@@ -11826,7 +12001,7 @@
                 <a:ea typeface="Intel Clear Light" panose="020B0404020203020204" pitchFamily="34" charset="0"/>
                 <a:cs typeface="Intel Clear Light" panose="020B0404020203020204" pitchFamily="34" charset="0"/>
               </a:rPr>
-              <a:t> is Iterator</a:t>
+              <a:t> is an Iterator</a:t>
             </a:r>
           </a:p>
           <a:p>
@@ -12859,6 +13034,35 @@
                 </a:solidFill>
                 <a:latin typeface="Consolas, "/>
               </a:rPr>
+              <a:t>    ++</a:t>
+            </a:r>
+            <a:r>
+              <a:rPr lang="en-US" sz="2400" dirty="0" err="1">
+                <a:solidFill>
+                  <a:srgbClr val="000000"/>
+                </a:solidFill>
+                <a:latin typeface="Consolas, "/>
+              </a:rPr>
+              <a:t>d_first</a:t>
+            </a:r>
+            <a:r>
+              <a:rPr lang="en-US" sz="2400" dirty="0">
+                <a:solidFill>
+                  <a:srgbClr val="000000"/>
+                </a:solidFill>
+                <a:latin typeface="Consolas, "/>
+              </a:rPr>
+              <a:t>;</a:t>
+            </a:r>
+          </a:p>
+          <a:p>
+            <a:r>
+              <a:rPr lang="en-US" sz="2400" dirty="0">
+                <a:solidFill>
+                  <a:srgbClr val="000000"/>
+                </a:solidFill>
+                <a:latin typeface="Consolas, "/>
+              </a:rPr>
               <a:t>}</a:t>
             </a:r>
           </a:p>
@@ -13591,7 +13795,7 @@
                 <a:ea typeface="Intel Clear Pro Bold" panose="020B0804020202060201" pitchFamily="34" charset="-52"/>
                 <a:cs typeface="Intel Clear Pro Bold" panose="020B0804020202060201" pitchFamily="34" charset="-52"/>
               </a:rPr>
-              <a:t>Range based for construction for containers</a:t>
+              <a:t>Range-based for loop</a:t>
             </a:r>
           </a:p>
         </p:txBody>
@@ -14070,7 +14274,7 @@
                 <a:ea typeface="Intel Clear Pro Bold" panose="020B0804020202060201" pitchFamily="34" charset="-52"/>
                 <a:cs typeface="Intel Clear Pro Bold" panose="020B0804020202060201" pitchFamily="34" charset="-52"/>
               </a:rPr>
-              <a:t>Range based for construction for containers</a:t>
+              <a:t>Range-based for loop</a:t>
             </a:r>
           </a:p>
         </p:txBody>
@@ -14923,7 +15127,7 @@
                 </a:solidFill>
                 <a:latin typeface="Consolas, "/>
               </a:rPr>
-              <a:t>class</a:t>
+              <a:t>struct</a:t>
             </a:r>
             <a:r>
               <a:rPr lang="en-US" sz="2400" dirty="0">
@@ -15512,13 +15716,49 @@
           </a:lstStyle>
           <a:p>
             <a:r>
+              <a:rPr lang="en-US" sz="2000" dirty="0">
+                <a:solidFill>
+                  <a:srgbClr val="0000FF"/>
+                </a:solidFill>
+                <a:latin typeface="Consolas, "/>
+              </a:rPr>
+              <a:t>struct</a:t>
+            </a:r>
+            <a:r>
               <a:rPr lang="en-US" sz="2133" dirty="0">
                 <a:solidFill>
+                  <a:srgbClr val="000000"/>
+                </a:solidFill>
+                <a:latin typeface="Consolas, "/>
+              </a:rPr>
+              <a:t> </a:t>
+            </a:r>
+            <a:r>
+              <a:rPr lang="en-US" sz="2133" dirty="0" err="1">
+                <a:solidFill>
+                  <a:srgbClr val="000000"/>
+                </a:solidFill>
+                <a:latin typeface="Consolas, "/>
+              </a:rPr>
+              <a:t>my_input_iterator</a:t>
+            </a:r>
+            <a:r>
+              <a:rPr lang="en-US" sz="2133" dirty="0">
+                <a:solidFill>
+                  <a:srgbClr val="000000"/>
+                </a:solidFill>
+                <a:latin typeface="Consolas, "/>
+              </a:rPr>
+              <a:t> : </a:t>
+            </a:r>
+            <a:r>
+              <a:rPr lang="en-US" sz="2133" dirty="0">
+                <a:solidFill>
                   <a:srgbClr val="0000FF"/>
                 </a:solidFill>
                 <a:latin typeface="Consolas, "/>
               </a:rPr>
-              <a:t>class</a:t>
+              <a:t>public</a:t>
             </a:r>
             <a:r>
               <a:rPr lang="en-US" sz="2133" dirty="0">
@@ -15536,6 +15776,82 @@
                 </a:solidFill>
                 <a:latin typeface="Consolas, "/>
               </a:rPr>
+              <a:t>my_iterator</a:t>
+            </a:r>
+            <a:r>
+              <a:rPr lang="en-US" sz="2133" dirty="0">
+                <a:solidFill>
+                  <a:srgbClr val="000000"/>
+                </a:solidFill>
+                <a:latin typeface="Consolas, "/>
+              </a:rPr>
+              <a:t> {</a:t>
+            </a:r>
+          </a:p>
+          <a:p>
+            <a:r>
+              <a:rPr lang="en-US" sz="2133" dirty="0">
+                <a:solidFill>
+                  <a:srgbClr val="000000"/>
+                </a:solidFill>
+                <a:latin typeface="Consolas, "/>
+              </a:rPr>
+              <a:t>    T* </a:t>
+            </a:r>
+            <a:r>
+              <a:rPr lang="en-US" sz="2133" dirty="0">
+                <a:solidFill>
+                  <a:srgbClr val="0000FF"/>
+                </a:solidFill>
+                <a:latin typeface="Consolas, "/>
+              </a:rPr>
+              <a:t>operator</a:t>
+            </a:r>
+            <a:r>
+              <a:rPr lang="en-US" sz="2133" dirty="0">
+                <a:solidFill>
+                  <a:srgbClr val="000000"/>
+                </a:solidFill>
+                <a:latin typeface="Consolas, "/>
+              </a:rPr>
+              <a:t>-&gt;() </a:t>
+            </a:r>
+            <a:r>
+              <a:rPr lang="en-US" sz="2133" dirty="0">
+                <a:solidFill>
+                  <a:srgbClr val="0000FF"/>
+                </a:solidFill>
+                <a:latin typeface="Consolas, "/>
+              </a:rPr>
+              <a:t>const</a:t>
+            </a:r>
+            <a:r>
+              <a:rPr lang="en-US" sz="2133" dirty="0">
+                <a:solidFill>
+                  <a:srgbClr val="000000"/>
+                </a:solidFill>
+                <a:latin typeface="Consolas, "/>
+              </a:rPr>
+              <a:t>;</a:t>
+            </a:r>
+          </a:p>
+          <a:p>
+            <a:r>
+              <a:rPr lang="en-US" sz="2133" dirty="0">
+                <a:solidFill>
+                  <a:srgbClr val="000000"/>
+                </a:solidFill>
+                <a:latin typeface="Consolas, "/>
+              </a:rPr>
+              <a:t>    </a:t>
+            </a:r>
+            <a:r>
+              <a:rPr lang="en-US" sz="2133" dirty="0" err="1">
+                <a:solidFill>
+                  <a:srgbClr val="000000"/>
+                </a:solidFill>
+                <a:latin typeface="Consolas, "/>
+              </a:rPr>
               <a:t>my_input_iterator</a:t>
             </a:r>
             <a:r>
@@ -15545,7 +15861,7 @@
                 </a:solidFill>
                 <a:latin typeface="Consolas, "/>
               </a:rPr>
-              <a:t> : </a:t>
+              <a:t> </a:t>
             </a:r>
             <a:r>
               <a:rPr lang="en-US" sz="2133" dirty="0">
@@ -15554,7 +15870,7 @@
                 </a:solidFill>
                 <a:latin typeface="Consolas, "/>
               </a:rPr>
-              <a:t>public</a:t>
+              <a:t>operator</a:t>
             </a:r>
             <a:r>
               <a:rPr lang="en-US" sz="2133" dirty="0">
@@ -15563,16 +15879,101 @@
                 </a:solidFill>
                 <a:latin typeface="Consolas, "/>
               </a:rPr>
+              <a:t>++(</a:t>
+            </a:r>
+            <a:r>
+              <a:rPr lang="en-US" sz="2133" dirty="0">
+                <a:solidFill>
+                  <a:srgbClr val="0000FF"/>
+                </a:solidFill>
+                <a:latin typeface="Consolas, "/>
+              </a:rPr>
+              <a:t>int</a:t>
+            </a:r>
+            <a:r>
+              <a:rPr lang="en-US" sz="2133" dirty="0">
+                <a:solidFill>
+                  <a:srgbClr val="000000"/>
+                </a:solidFill>
+                <a:latin typeface="Consolas, "/>
+              </a:rPr>
+              <a:t>);</a:t>
+            </a:r>
+          </a:p>
+          <a:p>
+            <a:r>
+              <a:rPr lang="en-US" sz="2133" dirty="0">
+                <a:solidFill>
+                  <a:srgbClr val="000000"/>
+                </a:solidFill>
+                <a:latin typeface="Consolas, "/>
+              </a:rPr>
+              <a:t>};</a:t>
+            </a:r>
+          </a:p>
+          <a:p>
+            <a:r>
+              <a:rPr lang="en-US" sz="2133" dirty="0">
+                <a:solidFill>
+                  <a:srgbClr val="0000FF"/>
+                </a:solidFill>
+                <a:latin typeface="Consolas, "/>
+              </a:rPr>
+              <a:t>bool</a:t>
+            </a:r>
+            <a:r>
+              <a:rPr lang="en-US" sz="2133" dirty="0">
+                <a:solidFill>
+                  <a:srgbClr val="000000"/>
+                </a:solidFill>
+                <a:latin typeface="Consolas, "/>
+              </a:rPr>
               <a:t> </a:t>
             </a:r>
             <a:r>
+              <a:rPr lang="en-US" sz="2133" dirty="0">
+                <a:solidFill>
+                  <a:srgbClr val="0000FF"/>
+                </a:solidFill>
+                <a:latin typeface="Consolas, "/>
+              </a:rPr>
+              <a:t>operator</a:t>
+            </a:r>
+            <a:r>
+              <a:rPr lang="en-US" sz="2133" dirty="0">
+                <a:solidFill>
+                  <a:srgbClr val="000000"/>
+                </a:solidFill>
+                <a:latin typeface="Consolas, "/>
+              </a:rPr>
+              <a:t>==(</a:t>
+            </a:r>
+            <a:r>
+              <a:rPr lang="en-US" sz="2133" dirty="0">
+                <a:solidFill>
+                  <a:srgbClr val="0000FF"/>
+                </a:solidFill>
+                <a:latin typeface="Consolas, "/>
+              </a:rPr>
+              <a:t>const</a:t>
+            </a:r>
+            <a:r>
+              <a:rPr lang="en-US" sz="2133" dirty="0">
+                <a:solidFill>
+                  <a:srgbClr val="000000"/>
+                </a:solidFill>
+                <a:latin typeface="Consolas, "/>
+              </a:rPr>
+              <a:t> </a:t>
+            </a:r>
+            <a:r>
               <a:rPr lang="en-US" sz="2133" dirty="0" err="1">
                 <a:solidFill>
                   <a:srgbClr val="000000"/>
                 </a:solidFill>
                 <a:latin typeface="Consolas, "/>
               </a:rPr>
-              <a:t>my_iterator</a:t>
+              <a:t>my_input_iterator</a:t>
             </a:r>
             <a:r>
               <a:rPr lang="en-US" sz="2133" dirty="0">
@@ -15581,10 +15982,17 @@
                 </a:solidFill>
                 <a:latin typeface="Consolas, "/>
               </a:rPr>
-              <a:t> {</a:t>
-            </a:r>
-          </a:p>
-          <a:p>
+              <a:t>&amp; </a:t>
+            </a:r>
+            <a:r>
+              <a:rPr lang="en-US" sz="2133" dirty="0" err="1">
+                <a:solidFill>
+                  <a:srgbClr val="000000"/>
+                </a:solidFill>
+                <a:latin typeface="Consolas, "/>
+              </a:rPr>
+              <a:t>lhs</a:t>
+            </a:r>
             <a:r>
               <a:rPr lang="en-US" sz="2133" dirty="0">
                 <a:solidFill>
@@ -15592,7 +16000,7 @@
                 </a:solidFill>
                 <a:latin typeface="Consolas, "/>
               </a:rPr>
-              <a:t>    T* </a:t>
+              <a:t>, </a:t>
             </a:r>
             <a:r>
               <a:rPr lang="en-US" sz="2133" dirty="0">
@@ -15601,6 +16009,80 @@
                 </a:solidFill>
                 <a:latin typeface="Consolas, "/>
               </a:rPr>
+              <a:t>const</a:t>
+            </a:r>
+            <a:r>
+              <a:rPr lang="en-US" sz="2133" dirty="0">
+                <a:solidFill>
+                  <a:srgbClr val="000000"/>
+                </a:solidFill>
+                <a:latin typeface="Consolas, "/>
+              </a:rPr>
+              <a:t> </a:t>
+            </a:r>
+            <a:r>
+              <a:rPr lang="en-US" sz="2133" dirty="0" err="1">
+                <a:solidFill>
+                  <a:srgbClr val="000000"/>
+                </a:solidFill>
+                <a:latin typeface="Consolas, "/>
+              </a:rPr>
+              <a:t>my_input_iterator</a:t>
+            </a:r>
+            <a:r>
+              <a:rPr lang="en-US" sz="2133" dirty="0">
+                <a:solidFill>
+                  <a:srgbClr val="000000"/>
+                </a:solidFill>
+                <a:latin typeface="Consolas, "/>
+              </a:rPr>
+              <a:t>&amp; </a:t>
+            </a:r>
+            <a:r>
+              <a:rPr lang="en-US" sz="2133" dirty="0" err="1">
+                <a:solidFill>
+                  <a:srgbClr val="000000"/>
+                </a:solidFill>
+                <a:latin typeface="Consolas, "/>
+              </a:rPr>
+              <a:t>rhs</a:t>
+            </a:r>
+            <a:r>
+              <a:rPr lang="en-US" sz="2133" dirty="0">
+                <a:solidFill>
+                  <a:srgbClr val="000000"/>
+                </a:solidFill>
+                <a:latin typeface="Consolas, "/>
+              </a:rPr>
+              <a:t>);</a:t>
+            </a:r>
+          </a:p>
+          <a:p>
+            <a:r>
+              <a:rPr lang="en-US" sz="2133" dirty="0">
+                <a:solidFill>
+                  <a:srgbClr val="0000FF"/>
+                </a:solidFill>
+                <a:latin typeface="Consolas, "/>
+              </a:rPr>
+              <a:t>bool</a:t>
+            </a:r>
+            <a:r>
+              <a:rPr lang="en-US" sz="2133" dirty="0">
+                <a:solidFill>
+                  <a:srgbClr val="000000"/>
+                </a:solidFill>
+                <a:latin typeface="Consolas, "/>
+              </a:rPr>
+              <a:t> </a:t>
+            </a:r>
+            <a:r>
+              <a:rPr lang="en-US" sz="2133" dirty="0">
+                <a:solidFill>
+                  <a:srgbClr val="0000FF"/>
+                </a:solidFill>
+                <a:latin typeface="Consolas, "/>
+              </a:rPr>
               <a:t>operator</a:t>
             </a:r>
             <a:r>
@@ -15610,7 +16092,7 @@
                 </a:solidFill>
                 <a:latin typeface="Consolas, "/>
               </a:rPr>
-              <a:t>-&gt;() </a:t>
+              <a:t>!=(</a:t>
             </a:r>
             <a:r>
               <a:rPr lang="en-US" sz="2133" dirty="0">
@@ -15628,10 +16110,17 @@
                 </a:solidFill>
                 <a:latin typeface="Consolas, "/>
               </a:rPr>
-              <a:t>;</a:t>
-            </a:r>
-          </a:p>
-          <a:p>
+              <a:t> </a:t>
+            </a:r>
+            <a:r>
+              <a:rPr lang="en-US" sz="2133" dirty="0" err="1">
+                <a:solidFill>
+                  <a:srgbClr val="000000"/>
+                </a:solidFill>
+                <a:latin typeface="Consolas, "/>
+              </a:rPr>
+              <a:t>my_input_iterator</a:t>
+            </a:r>
             <a:r>
               <a:rPr lang="en-US" sz="2133" dirty="0">
                 <a:solidFill>
@@ -15639,7 +16128,7 @@
                 </a:solidFill>
                 <a:latin typeface="Consolas, "/>
               </a:rPr>
-              <a:t>    </a:t>
+              <a:t>&amp; </a:t>
             </a:r>
             <a:r>
               <a:rPr lang="en-US" sz="2133" dirty="0" err="1">
@@ -15648,6 +16137,42 @@
                 </a:solidFill>
                 <a:latin typeface="Consolas, "/>
               </a:rPr>
+              <a:t>lhs</a:t>
+            </a:r>
+            <a:r>
+              <a:rPr lang="en-US" sz="2133" dirty="0">
+                <a:solidFill>
+                  <a:srgbClr val="000000"/>
+                </a:solidFill>
+                <a:latin typeface="Consolas, "/>
+              </a:rPr>
+              <a:t>, </a:t>
+            </a:r>
+            <a:r>
+              <a:rPr lang="en-US" sz="2133" dirty="0">
+                <a:solidFill>
+                  <a:srgbClr val="0000FF"/>
+                </a:solidFill>
+                <a:latin typeface="Consolas, "/>
+              </a:rPr>
+              <a:t>const</a:t>
+            </a:r>
+            <a:r>
+              <a:rPr lang="en-US" sz="2133" dirty="0">
+                <a:solidFill>
+                  <a:srgbClr val="000000"/>
+                </a:solidFill>
+                <a:latin typeface="Consolas, "/>
+              </a:rPr>
+              <a:t> </a:t>
+            </a:r>
+            <a:r>
+              <a:rPr lang="en-US" sz="2133" dirty="0" err="1">
+                <a:solidFill>
+                  <a:srgbClr val="000000"/>
+                </a:solidFill>
+                <a:latin typeface="Consolas, "/>
+              </a:rPr>
               <a:t>my_input_iterator</a:t>
             </a:r>
             <a:r>
@@ -15657,328 +16182,7 @@
                 </a:solidFill>
                 <a:latin typeface="Consolas, "/>
               </a:rPr>
-              <a:t> </a:t>
-            </a:r>
-            <a:r>
-              <a:rPr lang="en-US" sz="2133" dirty="0">
-                <a:solidFill>
-                  <a:srgbClr val="0000FF"/>
-                </a:solidFill>
-                <a:latin typeface="Consolas, "/>
-              </a:rPr>
-              <a:t>operator</a:t>
-            </a:r>
-            <a:r>
-              <a:rPr lang="en-US" sz="2133" dirty="0">
-                <a:solidFill>
-                  <a:srgbClr val="000000"/>
-                </a:solidFill>
-                <a:latin typeface="Consolas, "/>
-              </a:rPr>
-              <a:t>++(</a:t>
-            </a:r>
-            <a:r>
-              <a:rPr lang="en-US" sz="2133" dirty="0">
-                <a:solidFill>
-                  <a:srgbClr val="0000FF"/>
-                </a:solidFill>
-                <a:latin typeface="Consolas, "/>
-              </a:rPr>
-              <a:t>int</a:t>
-            </a:r>
-            <a:r>
-              <a:rPr lang="en-US" sz="2133" dirty="0">
-                <a:solidFill>
-                  <a:srgbClr val="000000"/>
-                </a:solidFill>
-                <a:latin typeface="Consolas, "/>
-              </a:rPr>
-              <a:t>);</a:t>
-            </a:r>
-          </a:p>
-          <a:p>
-            <a:r>
-              <a:rPr lang="en-US" sz="2133" dirty="0">
-                <a:solidFill>
-                  <a:srgbClr val="000000"/>
-                </a:solidFill>
-                <a:latin typeface="Consolas, "/>
-              </a:rPr>
-              <a:t>};</a:t>
-            </a:r>
-          </a:p>
-          <a:p>
-            <a:r>
-              <a:rPr lang="en-US" sz="2133" dirty="0">
-                <a:solidFill>
-                  <a:srgbClr val="0000FF"/>
-                </a:solidFill>
-                <a:latin typeface="Consolas, "/>
-              </a:rPr>
-              <a:t>bool</a:t>
-            </a:r>
-            <a:r>
-              <a:rPr lang="en-US" sz="2133" dirty="0">
-                <a:solidFill>
-                  <a:srgbClr val="000000"/>
-                </a:solidFill>
-                <a:latin typeface="Consolas, "/>
-              </a:rPr>
-              <a:t> </a:t>
-            </a:r>
-            <a:r>
-              <a:rPr lang="en-US" sz="2133" dirty="0">
-                <a:solidFill>
-                  <a:srgbClr val="0000FF"/>
-                </a:solidFill>
-                <a:latin typeface="Consolas, "/>
-              </a:rPr>
-              <a:t>operator</a:t>
-            </a:r>
-            <a:r>
-              <a:rPr lang="en-US" sz="2133" dirty="0">
-                <a:solidFill>
-                  <a:srgbClr val="000000"/>
-                </a:solidFill>
-                <a:latin typeface="Consolas, "/>
-              </a:rPr>
-              <a:t>==(</a:t>
-            </a:r>
-            <a:r>
-              <a:rPr lang="en-US" sz="2133" dirty="0">
-                <a:solidFill>
-                  <a:srgbClr val="0000FF"/>
-                </a:solidFill>
-                <a:latin typeface="Consolas, "/>
-              </a:rPr>
-              <a:t>const</a:t>
-            </a:r>
-            <a:r>
-              <a:rPr lang="en-US" sz="2133" dirty="0">
-                <a:solidFill>
-                  <a:srgbClr val="000000"/>
-                </a:solidFill>
-                <a:latin typeface="Consolas, "/>
-              </a:rPr>
-              <a:t> </a:t>
-            </a:r>
-            <a:r>
-              <a:rPr lang="en-US" sz="2133" dirty="0" err="1">
-                <a:solidFill>
-                  <a:srgbClr val="000000"/>
-                </a:solidFill>
-                <a:latin typeface="Consolas, "/>
-              </a:rPr>
-              <a:t>my_input_iterator</a:t>
-            </a:r>
-            <a:r>
-              <a:rPr lang="en-US" sz="2133" dirty="0">
-                <a:solidFill>
-                  <a:srgbClr val="000000"/>
-                </a:solidFill>
-                <a:latin typeface="Consolas, "/>
-              </a:rPr>
-              <a:t> </a:t>
-            </a:r>
-            <a:r>
-              <a:rPr lang="en-US" sz="2133" dirty="0" err="1">
-                <a:solidFill>
-                  <a:srgbClr val="000000"/>
-                </a:solidFill>
-                <a:latin typeface="Consolas, "/>
-              </a:rPr>
-              <a:t>lhs</a:t>
-            </a:r>
-            <a:r>
-              <a:rPr lang="en-US" sz="2133" dirty="0">
-                <a:solidFill>
-                  <a:srgbClr val="000000"/>
-                </a:solidFill>
-                <a:latin typeface="Consolas, "/>
-              </a:rPr>
-              <a:t>, </a:t>
-            </a:r>
-            <a:r>
-              <a:rPr lang="en-US" sz="2133" dirty="0">
-                <a:solidFill>
-                  <a:srgbClr val="0000FF"/>
-                </a:solidFill>
-                <a:latin typeface="Consolas, "/>
-              </a:rPr>
-              <a:t>const</a:t>
-            </a:r>
-            <a:r>
-              <a:rPr lang="en-US" sz="2133" dirty="0">
-                <a:solidFill>
-                  <a:srgbClr val="000000"/>
-                </a:solidFill>
-                <a:latin typeface="Consolas, "/>
-              </a:rPr>
-              <a:t> </a:t>
-            </a:r>
-            <a:r>
-              <a:rPr lang="en-US" sz="2133" dirty="0" err="1">
-                <a:solidFill>
-                  <a:srgbClr val="000000"/>
-                </a:solidFill>
-                <a:latin typeface="Consolas, "/>
-              </a:rPr>
-              <a:t>my_input_iterator</a:t>
-            </a:r>
-            <a:r>
-              <a:rPr lang="en-US" sz="2133" dirty="0">
-                <a:solidFill>
-                  <a:srgbClr val="000000"/>
-                </a:solidFill>
-                <a:latin typeface="Consolas, "/>
-              </a:rPr>
-              <a:t> </a:t>
-            </a:r>
-            <a:r>
-              <a:rPr lang="en-US" sz="2133" dirty="0" err="1">
-                <a:solidFill>
-                  <a:srgbClr val="000000"/>
-                </a:solidFill>
-                <a:latin typeface="Consolas, "/>
-              </a:rPr>
-              <a:t>rhs</a:t>
-            </a:r>
-            <a:r>
-              <a:rPr lang="en-US" sz="2133" dirty="0">
-                <a:solidFill>
-                  <a:srgbClr val="000000"/>
-                </a:solidFill>
-                <a:latin typeface="Consolas, "/>
-              </a:rPr>
-              <a:t>);</a:t>
-            </a:r>
-          </a:p>
-          <a:p>
-            <a:r>
-              <a:rPr lang="en-US" sz="2133" dirty="0">
-                <a:solidFill>
-                  <a:srgbClr val="0000FF"/>
-                </a:solidFill>
-                <a:latin typeface="Consolas, "/>
-              </a:rPr>
-              <a:t>bool</a:t>
-            </a:r>
-            <a:r>
-              <a:rPr lang="en-US" sz="2133" dirty="0">
-                <a:solidFill>
-                  <a:srgbClr val="000000"/>
-                </a:solidFill>
-                <a:latin typeface="Consolas, "/>
-              </a:rPr>
-              <a:t> </a:t>
-            </a:r>
-            <a:r>
-              <a:rPr lang="en-US" sz="2133" dirty="0">
-                <a:solidFill>
-                  <a:srgbClr val="0000FF"/>
-                </a:solidFill>
-                <a:latin typeface="Consolas, "/>
-              </a:rPr>
-              <a:t>operator</a:t>
-            </a:r>
-            <a:r>
-              <a:rPr lang="en-US" sz="2133" dirty="0">
-                <a:solidFill>
-                  <a:srgbClr val="000000"/>
-                </a:solidFill>
-                <a:latin typeface="Consolas, "/>
-              </a:rPr>
-              <a:t>!=(</a:t>
-            </a:r>
-            <a:r>
-              <a:rPr lang="en-US" sz="2133" dirty="0">
-                <a:solidFill>
-                  <a:srgbClr val="0000FF"/>
-                </a:solidFill>
-                <a:latin typeface="Consolas, "/>
-              </a:rPr>
-              <a:t>const</a:t>
-            </a:r>
-            <a:r>
-              <a:rPr lang="en-US" sz="2133" dirty="0">
-                <a:solidFill>
-                  <a:srgbClr val="000000"/>
-                </a:solidFill>
-                <a:latin typeface="Consolas, "/>
-              </a:rPr>
-              <a:t> </a:t>
-            </a:r>
-            <a:r>
-              <a:rPr lang="en-US" sz="2133" dirty="0" err="1">
-                <a:solidFill>
-                  <a:srgbClr val="000000"/>
-                </a:solidFill>
-                <a:latin typeface="Consolas, "/>
-              </a:rPr>
-              <a:t>my_input_iterator</a:t>
-            </a:r>
-            <a:r>
-              <a:rPr lang="en-US" sz="2133" dirty="0">
-                <a:solidFill>
-                  <a:srgbClr val="000000"/>
-                </a:solidFill>
-                <a:latin typeface="Consolas, "/>
-              </a:rPr>
-              <a:t> </a:t>
-            </a:r>
-            <a:r>
-              <a:rPr lang="en-US" sz="2133" dirty="0" err="1">
-                <a:solidFill>
-                  <a:srgbClr val="000000"/>
-                </a:solidFill>
-                <a:latin typeface="Consolas, "/>
-              </a:rPr>
-              <a:t>lhs</a:t>
-            </a:r>
-            <a:r>
-              <a:rPr lang="en-US" sz="2133" dirty="0">
-                <a:solidFill>
-                  <a:srgbClr val="000000"/>
-                </a:solidFill>
-                <a:latin typeface="Consolas, "/>
-              </a:rPr>
-              <a:t>, </a:t>
-            </a:r>
-            <a:r>
-              <a:rPr lang="en-US" sz="2133" dirty="0">
-                <a:solidFill>
-                  <a:srgbClr val="0000FF"/>
-                </a:solidFill>
-                <a:latin typeface="Consolas, "/>
-              </a:rPr>
-              <a:t>const</a:t>
-            </a:r>
-            <a:r>
-              <a:rPr lang="en-US" sz="2133" dirty="0">
-                <a:solidFill>
-                  <a:srgbClr val="000000"/>
-                </a:solidFill>
-                <a:latin typeface="Consolas, "/>
-              </a:rPr>
-              <a:t> </a:t>
-            </a:r>
-            <a:r>
-              <a:rPr lang="en-US" sz="2133" dirty="0" err="1">
-                <a:solidFill>
-                  <a:srgbClr val="000000"/>
-                </a:solidFill>
-                <a:latin typeface="Consolas, "/>
-              </a:rPr>
-              <a:t>my_input_iterator</a:t>
-            </a:r>
-            <a:r>
-              <a:rPr lang="en-US" sz="2133" dirty="0">
-                <a:solidFill>
-                  <a:srgbClr val="000000"/>
-                </a:solidFill>
-                <a:latin typeface="Consolas, "/>
-              </a:rPr>
-              <a:t> </a:t>
+              <a:t>&amp; </a:t>
             </a:r>
             <a:r>
               <a:rPr lang="en-US" sz="2133" dirty="0" err="1">
@@ -16282,7 +16486,7 @@
                 </a:solidFill>
                 <a:latin typeface="Consolas, "/>
               </a:rPr>
-              <a:t>class</a:t>
+              <a:t>struct</a:t>
             </a:r>
             <a:r>
               <a:rPr lang="en-US" sz="2400" dirty="0">
@@ -16671,7 +16875,7 @@
                 </a:solidFill>
                 <a:latin typeface="Consolas, "/>
               </a:rPr>
-              <a:t>class</a:t>
+              <a:t>struct</a:t>
             </a:r>
             <a:r>
               <a:rPr lang="en-US" sz="2400" dirty="0">
@@ -16993,7 +17197,7 @@
         </p:spPr>
         <p:txBody>
           <a:bodyPr>
-            <a:normAutofit lnSpcReduction="10000"/>
+            <a:normAutofit fontScale="92500" lnSpcReduction="20000"/>
           </a:bodyPr>
           <a:lstStyle>
             <a:lvl1pPr marL="0" indent="0" algn="l" defTabSz="457200" rtl="0" eaLnBrk="1" latinLnBrk="0" hangingPunct="1">
@@ -17143,7 +17347,7 @@
                 </a:solidFill>
                 <a:latin typeface="Consolas, "/>
               </a:rPr>
-              <a:t>class</a:t>
+              <a:t>struct</a:t>
             </a:r>
             <a:r>
               <a:rPr lang="en-US" sz="2400" dirty="0">
@@ -17161,7 +17365,7 @@
                 </a:solidFill>
                 <a:latin typeface="Consolas, "/>
               </a:rPr>
-              <a:t>my_racc_iterator</a:t>
+              <a:t>my_random_access_iterator</a:t>
             </a:r>
             <a:r>
               <a:rPr lang="en-US" sz="2400" dirty="0">
@@ -17199,14 +17403,22 @@
               </a:rPr>
               <a:t>my_bidirectional_iterator</a:t>
             </a:r>
-            <a:r>
-              <a:rPr lang="en-US" sz="2400" dirty="0">
-                <a:solidFill>
-                  <a:srgbClr val="000000"/>
-                </a:solidFill>
-                <a:latin typeface="Consolas, "/>
-              </a:rPr>
-              <a:t> {</a:t>
+            <a:endParaRPr lang="en-US" sz="2400" dirty="0">
+              <a:solidFill>
+                <a:srgbClr val="000000"/>
+              </a:solidFill>
+              <a:latin typeface="Consolas, "/>
+            </a:endParaRPr>
+          </a:p>
+          <a:p>
+            <a:r>
+              <a:rPr lang="en-US" sz="2400" dirty="0">
+                <a:solidFill>
+                  <a:srgbClr val="000000"/>
+                </a:solidFill>
+                <a:latin typeface="Consolas, "/>
+              </a:rPr>
+              <a:t>{</a:t>
             </a:r>
           </a:p>
           <a:p>
@@ -17226,7 +17438,7 @@
                 </a:solidFill>
                 <a:latin typeface="Consolas, "/>
               </a:rPr>
-              <a:t>my_racc_iterator</a:t>
+              <a:t>my_random_access_iterator</a:t>
             </a:r>
             <a:r>
               <a:rPr lang="en-US" sz="2400" dirty="0">
@@ -17309,7 +17521,7 @@
                 </a:solidFill>
                 <a:latin typeface="Consolas, "/>
               </a:rPr>
-              <a:t>my_racc_iterator</a:t>
+              <a:t>my_random_access_iterator</a:t>
             </a:r>
             <a:r>
               <a:rPr lang="en-US" sz="2400" dirty="0">
@@ -17374,7 +17586,7 @@
                 </a:solidFill>
                 <a:latin typeface="Consolas, "/>
               </a:rPr>
-              <a:t>my_racc_iterator</a:t>
+              <a:t>my_random_access_iterator</a:t>
             </a:r>
             <a:r>
               <a:rPr lang="en-US" sz="2400" dirty="0">
@@ -17629,7 +17841,7 @@
         </p:spPr>
         <p:txBody>
           <a:bodyPr>
-            <a:normAutofit fontScale="92500" lnSpcReduction="10000"/>
+            <a:normAutofit fontScale="77500" lnSpcReduction="20000"/>
           </a:bodyPr>
           <a:lstStyle>
             <a:lvl1pPr marL="0" indent="0" algn="l" defTabSz="457200" rtl="0" eaLnBrk="1" latinLnBrk="0" hangingPunct="1">
@@ -17779,7 +17991,7 @@
                 </a:solidFill>
                 <a:latin typeface="Consolas, "/>
               </a:rPr>
-              <a:t>class</a:t>
+              <a:t>struct</a:t>
             </a:r>
             <a:r>
               <a:rPr lang="en-US" sz="2400" dirty="0">
@@ -17797,16 +18009,16 @@
                 </a:solidFill>
                 <a:latin typeface="Consolas, "/>
               </a:rPr>
-              <a:t>my_racc_iterator</a:t>
-            </a:r>
-            <a:r>
-              <a:rPr lang="en-US" sz="2400" dirty="0">
-                <a:solidFill>
-                  <a:srgbClr val="000000"/>
-                </a:solidFill>
-                <a:latin typeface="Consolas, "/>
-              </a:rPr>
-              <a:t> : </a:t>
+              <a:t>my_random_access_iterator</a:t>
+            </a:r>
+            <a:r>
+              <a:rPr lang="en-US" sz="2400" dirty="0">
+                <a:solidFill>
+                  <a:srgbClr val="000000"/>
+                </a:solidFill>
+                <a:latin typeface="Consolas, "/>
+              </a:rPr>
+              <a:t> : </a:t>
             </a:r>
             <a:r>
               <a:rPr lang="en-US" sz="2400" dirty="0">
@@ -17861,7 +18073,61 @@
                 </a:solidFill>
                 <a:latin typeface="Consolas, "/>
               </a:rPr>
-              <a:t>my_racc_iterator</a:t>
+              <a:t>my_random_access_iterator</a:t>
+            </a:r>
+            <a:r>
+              <a:rPr lang="en-US" sz="2400" dirty="0">
+                <a:solidFill>
+                  <a:srgbClr val="000000"/>
+                </a:solidFill>
+                <a:latin typeface="Consolas, "/>
+              </a:rPr>
+              <a:t> </a:t>
+            </a:r>
+            <a:r>
+              <a:rPr lang="en-US" sz="2400" dirty="0">
+                <a:solidFill>
+                  <a:srgbClr val="0000FF"/>
+                </a:solidFill>
+                <a:latin typeface="Consolas, "/>
+              </a:rPr>
+              <a:t>operator</a:t>
+            </a:r>
+            <a:r>
+              <a:rPr lang="en-US" sz="2400" dirty="0">
+                <a:solidFill>
+                  <a:srgbClr val="000000"/>
+                </a:solidFill>
+                <a:latin typeface="Consolas, "/>
+              </a:rPr>
+              <a:t>+(</a:t>
+            </a:r>
+            <a:r>
+              <a:rPr lang="en-US" sz="2400" dirty="0">
+                <a:solidFill>
+                  <a:srgbClr val="0000FF"/>
+                </a:solidFill>
+                <a:latin typeface="Consolas, "/>
+              </a:rPr>
+              <a:t>int</a:t>
+            </a:r>
+            <a:r>
+              <a:rPr lang="en-US" sz="2400" dirty="0">
+                <a:solidFill>
+                  <a:srgbClr val="000000"/>
+                </a:solidFill>
+                <a:latin typeface="Consolas, "/>
+              </a:rPr>
+              <a:t> n, </a:t>
+            </a:r>
+            <a:r>
+              <a:rPr lang="en-US" sz="2400" dirty="0">
+                <a:solidFill>
+                  <a:srgbClr val="0000FF"/>
+                </a:solidFill>
+                <a:latin typeface="Consolas, "/>
+              </a:rPr>
+              <a:t>const</a:t>
             </a:r>
             <a:r>
               <a:rPr lang="en-US" sz="2400" dirty="0">
@@ -17873,6 +18139,44 @@
               <a:t> </a:t>
             </a:r>
             <a:r>
+              <a:rPr lang="en-US" sz="2400" dirty="0" err="1">
+                <a:solidFill>
+                  <a:srgbClr val="000000"/>
+                </a:solidFill>
+                <a:latin typeface="Consolas, "/>
+              </a:rPr>
+              <a:t>my_random_access_iterator</a:t>
+            </a:r>
+            <a:r>
+              <a:rPr lang="en-US" sz="2400" dirty="0">
+                <a:solidFill>
+                  <a:srgbClr val="000000"/>
+                </a:solidFill>
+                <a:latin typeface="Consolas, "/>
+              </a:rPr>
+              <a:t>&amp; it);</a:t>
+            </a:r>
+          </a:p>
+          <a:p>
+            <a:r>
+              <a:rPr lang="en-US" sz="2400" dirty="0" err="1">
+                <a:solidFill>
+                  <a:srgbClr val="000000"/>
+                </a:solidFill>
+                <a:latin typeface="Consolas, "/>
+              </a:rPr>
+              <a:t>my_random_access_iterator</a:t>
+            </a:r>
+            <a:r>
+              <a:rPr lang="en-US" sz="2400" dirty="0">
+                <a:solidFill>
+                  <a:srgbClr val="000000"/>
+                </a:solidFill>
+                <a:latin typeface="Consolas, "/>
+              </a:rPr>
+              <a:t> </a:t>
+            </a:r>
+            <a:r>
               <a:rPr lang="en-US" sz="2400" dirty="0">
                 <a:solidFill>
                   <a:srgbClr val="0000FF"/>
@@ -17897,6 +18201,42 @@
                 </a:solidFill>
                 <a:latin typeface="Consolas, "/>
               </a:rPr>
+              <a:t>const</a:t>
+            </a:r>
+            <a:r>
+              <a:rPr lang="en-US" sz="2400" dirty="0">
+                <a:solidFill>
+                  <a:srgbClr val="000000"/>
+                </a:solidFill>
+                <a:latin typeface="Consolas, "/>
+              </a:rPr>
+              <a:t> </a:t>
+            </a:r>
+            <a:r>
+              <a:rPr lang="en-US" sz="2400" dirty="0" err="1">
+                <a:solidFill>
+                  <a:srgbClr val="000000"/>
+                </a:solidFill>
+                <a:latin typeface="Consolas, "/>
+              </a:rPr>
+              <a:t>my_random_access_iterator</a:t>
+            </a:r>
+            <a:r>
+              <a:rPr lang="en-US" sz="2400" dirty="0">
+                <a:solidFill>
+                  <a:srgbClr val="000000"/>
+                </a:solidFill>
+                <a:latin typeface="Consolas, "/>
+              </a:rPr>
+              <a:t>&amp; it, </a:t>
+            </a:r>
+            <a:r>
+              <a:rPr lang="en-US" sz="2400" dirty="0">
+                <a:solidFill>
+                  <a:srgbClr val="0000FF"/>
+                </a:solidFill>
+                <a:latin typeface="Consolas, "/>
+              </a:rPr>
               <a:t>int</a:t>
             </a:r>
             <a:r>
@@ -17906,8 +18246,10 @@
                 </a:solidFill>
                 <a:latin typeface="Consolas, "/>
               </a:rPr>
-              <a:t> n, </a:t>
-            </a:r>
+              <a:t> n);</a:t>
+            </a:r>
+          </a:p>
+          <a:p>
             <a:r>
               <a:rPr lang="en-US" sz="2400" dirty="0">
                 <a:solidFill>
@@ -17915,6 +18257,42 @@
                 </a:solidFill>
                 <a:latin typeface="Consolas, "/>
               </a:rPr>
+              <a:t>int</a:t>
+            </a:r>
+            <a:r>
+              <a:rPr lang="en-US" sz="2400" dirty="0">
+                <a:solidFill>
+                  <a:srgbClr val="000000"/>
+                </a:solidFill>
+                <a:latin typeface="Consolas, "/>
+              </a:rPr>
+              <a:t>  </a:t>
+            </a:r>
+            <a:r>
+              <a:rPr lang="en-US" sz="2400" dirty="0">
+                <a:solidFill>
+                  <a:srgbClr val="0000FF"/>
+                </a:solidFill>
+                <a:latin typeface="Consolas, "/>
+              </a:rPr>
+              <a:t>operator</a:t>
+            </a:r>
+            <a:r>
+              <a:rPr lang="en-US" sz="2400" dirty="0">
+                <a:solidFill>
+                  <a:srgbClr val="000000"/>
+                </a:solidFill>
+                <a:latin typeface="Consolas, "/>
+              </a:rPr>
+              <a:t>-(</a:t>
+            </a:r>
+            <a:r>
+              <a:rPr lang="en-US" sz="2400" dirty="0">
+                <a:solidFill>
+                  <a:srgbClr val="0000FF"/>
+                </a:solidFill>
+                <a:latin typeface="Consolas, "/>
+              </a:rPr>
               <a:t>const</a:t>
             </a:r>
             <a:r>
@@ -17933,19 +18311,17 @@
                 </a:solidFill>
                 <a:latin typeface="Consolas, "/>
               </a:rPr>
-              <a:t>my_racc_iterator</a:t>
-            </a:r>
-            <a:r>
-              <a:rPr lang="en-US" sz="2400" dirty="0">
-                <a:solidFill>
-                  <a:srgbClr val="000000"/>
-                </a:solidFill>
-                <a:latin typeface="Consolas, "/>
-              </a:rPr>
-              <a:t>&amp; it);</a:t>
-            </a:r>
-          </a:p>
-          <a:p>
+              <a:t>my_random_access_iterator</a:t>
+            </a:r>
+            <a:r>
+              <a:rPr lang="en-US" sz="2400" dirty="0">
+                <a:solidFill>
+                  <a:srgbClr val="000000"/>
+                </a:solidFill>
+                <a:latin typeface="Consolas, "/>
+              </a:rPr>
+              <a:t>&amp; </a:t>
+            </a:r>
             <a:r>
               <a:rPr lang="en-US" sz="2400" dirty="0" err="1">
                 <a:solidFill>
@@ -17953,7 +18329,36 @@
                 </a:solidFill>
                 <a:latin typeface="Consolas, "/>
               </a:rPr>
-              <a:t>my_racc_iterator</a:t>
+              <a:t>lhs</a:t>
+            </a:r>
+            <a:r>
+              <a:rPr lang="en-US" sz="2400" dirty="0">
+                <a:solidFill>
+                  <a:srgbClr val="000000"/>
+                </a:solidFill>
+                <a:latin typeface="Consolas, "/>
+              </a:rPr>
+              <a:t>,</a:t>
+            </a:r>
+          </a:p>
+          <a:p>
+            <a:r>
+              <a:rPr lang="en-US" sz="2400" dirty="0">
+                <a:solidFill>
+                  <a:srgbClr val="000000"/>
+                </a:solidFill>
+                <a:latin typeface="Consolas, "/>
+              </a:rPr>
+              <a:t>               </a:t>
+            </a:r>
+            <a:r>
+              <a:rPr lang="en-US" sz="2400" dirty="0">
+                <a:solidFill>
+                  <a:srgbClr val="0000FF"/>
+                </a:solidFill>
+                <a:latin typeface="Consolas, "/>
+              </a:rPr>
+              <a:t>const</a:t>
             </a:r>
             <a:r>
               <a:rPr lang="en-US" sz="2400" dirty="0">
@@ -17965,12 +18370,68 @@
               <a:t> </a:t>
             </a:r>
             <a:r>
+              <a:rPr lang="en-US" sz="2400" dirty="0" err="1">
+                <a:solidFill>
+                  <a:srgbClr val="000000"/>
+                </a:solidFill>
+                <a:latin typeface="Consolas, "/>
+              </a:rPr>
+              <a:t>my_random_access_iterator</a:t>
+            </a:r>
+            <a:r>
+              <a:rPr lang="en-US" sz="2400" dirty="0">
+                <a:solidFill>
+                  <a:srgbClr val="000000"/>
+                </a:solidFill>
+                <a:latin typeface="Consolas, "/>
+              </a:rPr>
+              <a:t>&amp; </a:t>
+            </a:r>
+            <a:r>
+              <a:rPr lang="en-US" sz="2400" dirty="0" err="1">
+                <a:solidFill>
+                  <a:srgbClr val="000000"/>
+                </a:solidFill>
+                <a:latin typeface="Consolas, "/>
+              </a:rPr>
+              <a:t>rhs</a:t>
+            </a:r>
+            <a:r>
+              <a:rPr lang="en-US" sz="2400" dirty="0">
+                <a:solidFill>
+                  <a:srgbClr val="000000"/>
+                </a:solidFill>
+                <a:latin typeface="Consolas, "/>
+              </a:rPr>
+              <a:t>);</a:t>
+            </a:r>
+          </a:p>
+          <a:p>
+            <a:r>
               <a:rPr lang="en-US" sz="2400" dirty="0">
                 <a:solidFill>
                   <a:srgbClr val="0000FF"/>
                 </a:solidFill>
                 <a:latin typeface="Consolas, "/>
               </a:rPr>
+              <a:t>bool</a:t>
+            </a:r>
+            <a:r>
+              <a:rPr lang="en-US" sz="2400" dirty="0">
+                <a:solidFill>
+                  <a:srgbClr val="000000"/>
+                </a:solidFill>
+                <a:latin typeface="Consolas, "/>
+              </a:rPr>
+              <a:t> </a:t>
+            </a:r>
+            <a:r>
+              <a:rPr lang="en-US" sz="2400" dirty="0">
+                <a:solidFill>
+                  <a:srgbClr val="0000FF"/>
+                </a:solidFill>
+                <a:latin typeface="Consolas, "/>
+              </a:rPr>
               <a:t>operator</a:t>
             </a:r>
             <a:r>
@@ -17980,7 +18441,7 @@
                 </a:solidFill>
                 <a:latin typeface="Consolas, "/>
               </a:rPr>
-              <a:t>+(</a:t>
+              <a:t>&lt;(</a:t>
             </a:r>
             <a:r>
               <a:rPr lang="en-US" sz="2400" dirty="0">
@@ -18007,17 +18468,37 @@
                 </a:solidFill>
                 <a:latin typeface="Consolas, "/>
               </a:rPr>
-              <a:t>my_racc_iterator</a:t>
-            </a:r>
-            <a:r>
-              <a:rPr lang="en-US" sz="2400" dirty="0">
-                <a:solidFill>
-                  <a:srgbClr val="000000"/>
-                </a:solidFill>
-                <a:latin typeface="Consolas, "/>
-              </a:rPr>
-              <a:t>&amp; it, </a:t>
-            </a:r>
+              <a:t>my_random_access_iterator</a:t>
+            </a:r>
+            <a:r>
+              <a:rPr lang="en-US" sz="2400" dirty="0">
+                <a:solidFill>
+                  <a:srgbClr val="000000"/>
+                </a:solidFill>
+                <a:latin typeface="Consolas, "/>
+              </a:rPr>
+              <a:t>&amp; </a:t>
+            </a:r>
+            <a:r>
+              <a:rPr lang="en-US" sz="2400" dirty="0" err="1">
+                <a:solidFill>
+                  <a:srgbClr val="000000"/>
+                </a:solidFill>
+                <a:latin typeface="Consolas, "/>
+              </a:rPr>
+              <a:t>lhs</a:t>
+            </a:r>
+            <a:r>
+              <a:rPr lang="en-US" sz="2400" dirty="0">
+                <a:solidFill>
+                  <a:srgbClr val="000000"/>
+                </a:solidFill>
+                <a:latin typeface="Consolas, "/>
+              </a:rPr>
+              <a:t>,</a:t>
+            </a:r>
+          </a:p>
+          <a:p>
             <a:r>
               <a:rPr lang="en-US" sz="2400" dirty="0">
                 <a:solidFill>
@@ -18025,27 +18506,7 @@
                 </a:solidFill>
                 <a:latin typeface="Consolas, "/>
               </a:rPr>
-              <a:t>int</a:t>
-            </a:r>
-            <a:r>
-              <a:rPr lang="en-US" sz="2400" dirty="0">
-                <a:solidFill>
-                  <a:srgbClr val="000000"/>
-                </a:solidFill>
-                <a:latin typeface="Consolas, "/>
-              </a:rPr>
-              <a:t> n);</a:t>
-            </a:r>
-          </a:p>
-          <a:p>
-            <a:r>
-              <a:rPr lang="en-US" sz="2400" dirty="0">
-                <a:solidFill>
-                  <a:srgbClr val="0000FF"/>
-                </a:solidFill>
-                <a:latin typeface="Consolas, "/>
-              </a:rPr>
-              <a:t>int</a:t>
+              <a:t>               const</a:t>
             </a:r>
             <a:r>
               <a:rPr lang="en-US" sz="2400" dirty="0">
@@ -18057,249 +18518,13 @@
               <a:t> </a:t>
             </a:r>
             <a:r>
-              <a:rPr lang="en-US" sz="2400" dirty="0">
-                <a:solidFill>
-                  <a:srgbClr val="0000FF"/>
-                </a:solidFill>
-                <a:latin typeface="Consolas, "/>
-              </a:rPr>
-              <a:t>operator</a:t>
-            </a:r>
-            <a:r>
-              <a:rPr lang="en-US" sz="2400" dirty="0">
-                <a:solidFill>
-                  <a:srgbClr val="000000"/>
-                </a:solidFill>
-                <a:latin typeface="Consolas, "/>
-              </a:rPr>
-              <a:t>-(</a:t>
-            </a:r>
-            <a:r>
-              <a:rPr lang="en-US" sz="2400" dirty="0">
-                <a:solidFill>
-                  <a:srgbClr val="0000FF"/>
-                </a:solidFill>
-                <a:latin typeface="Consolas, "/>
-              </a:rPr>
-              <a:t>const</a:t>
-            </a:r>
-            <a:r>
-              <a:rPr lang="en-US" sz="2400" dirty="0">
-                <a:solidFill>
-                  <a:srgbClr val="000000"/>
-                </a:solidFill>
-                <a:latin typeface="Consolas, "/>
-              </a:rPr>
-              <a:t> </a:t>
-            </a:r>
-            <a:r>
               <a:rPr lang="en-US" sz="2400" dirty="0" err="1">
                 <a:solidFill>
                   <a:srgbClr val="000000"/>
                 </a:solidFill>
                 <a:latin typeface="Consolas, "/>
               </a:rPr>
-              <a:t>my_racc_iterator</a:t>
-            </a:r>
-            <a:r>
-              <a:rPr lang="en-US" sz="2400" dirty="0">
-                <a:solidFill>
-                  <a:srgbClr val="000000"/>
-                </a:solidFill>
-                <a:latin typeface="Consolas, "/>
-              </a:rPr>
-              <a:t>&amp; </a:t>
-            </a:r>
-            <a:r>
-              <a:rPr lang="en-US" sz="2400" dirty="0" err="1">
-                <a:solidFill>
-                  <a:srgbClr val="000000"/>
-                </a:solidFill>
-                <a:latin typeface="Consolas, "/>
-              </a:rPr>
-              <a:t>lhs</a:t>
-            </a:r>
-            <a:r>
-              <a:rPr lang="en-US" sz="2400" dirty="0">
-                <a:solidFill>
-                  <a:srgbClr val="000000"/>
-                </a:solidFill>
-                <a:latin typeface="Consolas, "/>
-              </a:rPr>
-              <a:t>, </a:t>
-            </a:r>
-            <a:r>
-              <a:rPr lang="en-US" sz="2400" dirty="0">
-                <a:solidFill>
-                  <a:srgbClr val="0000FF"/>
-                </a:solidFill>
-                <a:latin typeface="Consolas, "/>
-              </a:rPr>
-              <a:t>const</a:t>
-            </a:r>
-            <a:r>
-              <a:rPr lang="en-US" sz="2400" dirty="0">
-                <a:solidFill>
-                  <a:srgbClr val="000000"/>
-                </a:solidFill>
-                <a:latin typeface="Consolas, "/>
-              </a:rPr>
-              <a:t> </a:t>
-            </a:r>
-            <a:r>
-              <a:rPr lang="en-US" sz="2400" dirty="0" err="1">
-                <a:solidFill>
-                  <a:srgbClr val="000000"/>
-                </a:solidFill>
-                <a:latin typeface="Consolas, "/>
-              </a:rPr>
-              <a:t>my_racc_iterator</a:t>
-            </a:r>
-            <a:r>
-              <a:rPr lang="en-US" sz="2400" dirty="0">
-                <a:solidFill>
-                  <a:srgbClr val="000000"/>
-                </a:solidFill>
-                <a:latin typeface="Consolas, "/>
-              </a:rPr>
-              <a:t>&amp; </a:t>
-            </a:r>
-            <a:r>
-              <a:rPr lang="en-US" sz="2400" dirty="0" err="1">
-                <a:solidFill>
-                  <a:srgbClr val="000000"/>
-                </a:solidFill>
-                <a:latin typeface="Consolas, "/>
-              </a:rPr>
-              <a:t>rhs</a:t>
-            </a:r>
-            <a:r>
-              <a:rPr lang="en-US" sz="2400" dirty="0">
-                <a:solidFill>
-                  <a:srgbClr val="000000"/>
-                </a:solidFill>
-                <a:latin typeface="Consolas, "/>
-              </a:rPr>
-              <a:t>);</a:t>
-            </a:r>
-          </a:p>
-          <a:p>
-            <a:r>
-              <a:rPr lang="en-US" sz="2400" dirty="0">
-                <a:solidFill>
-                  <a:srgbClr val="0000FF"/>
-                </a:solidFill>
-                <a:latin typeface="Consolas, "/>
-              </a:rPr>
-              <a:t>bool</a:t>
-            </a:r>
-            <a:r>
-              <a:rPr lang="en-US" sz="2400" dirty="0">
-                <a:solidFill>
-                  <a:srgbClr val="000000"/>
-                </a:solidFill>
-                <a:latin typeface="Consolas, "/>
-              </a:rPr>
-              <a:t> </a:t>
-            </a:r>
-            <a:r>
-              <a:rPr lang="en-US" sz="2400" dirty="0">
-                <a:solidFill>
-                  <a:srgbClr val="0000FF"/>
-                </a:solidFill>
-                <a:latin typeface="Consolas, "/>
-              </a:rPr>
-              <a:t>operator</a:t>
-            </a:r>
-            <a:r>
-              <a:rPr lang="en-US" sz="2400" dirty="0">
-                <a:solidFill>
-                  <a:srgbClr val="000000"/>
-                </a:solidFill>
-                <a:latin typeface="Consolas, "/>
-              </a:rPr>
-              <a:t>&lt;(</a:t>
-            </a:r>
-            <a:r>
-              <a:rPr lang="en-US" sz="2400" dirty="0">
-                <a:solidFill>
-                  <a:srgbClr val="0000FF"/>
-                </a:solidFill>
-                <a:latin typeface="Consolas, "/>
-              </a:rPr>
-              <a:t>const</a:t>
-            </a:r>
-            <a:r>
-              <a:rPr lang="en-US" sz="2400" dirty="0">
-                <a:solidFill>
-                  <a:srgbClr val="000000"/>
-                </a:solidFill>
-                <a:latin typeface="Consolas, "/>
-              </a:rPr>
-              <a:t> </a:t>
-            </a:r>
-            <a:r>
-              <a:rPr lang="en-US" sz="2400" dirty="0" err="1">
-                <a:solidFill>
-                  <a:srgbClr val="000000"/>
-                </a:solidFill>
-                <a:latin typeface="Consolas, "/>
-              </a:rPr>
-              <a:t>my_racc_iterator</a:t>
-            </a:r>
-            <a:r>
-              <a:rPr lang="en-US" sz="2400" dirty="0">
-                <a:solidFill>
-                  <a:srgbClr val="000000"/>
-                </a:solidFill>
-                <a:latin typeface="Consolas, "/>
-              </a:rPr>
-              <a:t>&amp; </a:t>
-            </a:r>
-            <a:r>
-              <a:rPr lang="en-US" sz="2400" dirty="0" err="1">
-                <a:solidFill>
-                  <a:srgbClr val="000000"/>
-                </a:solidFill>
-                <a:latin typeface="Consolas, "/>
-              </a:rPr>
-              <a:t>lhs</a:t>
-            </a:r>
-            <a:r>
-              <a:rPr lang="en-US" sz="2400" dirty="0">
-                <a:solidFill>
-                  <a:srgbClr val="000000"/>
-                </a:solidFill>
-                <a:latin typeface="Consolas, "/>
-              </a:rPr>
-              <a:t>, </a:t>
-            </a:r>
-            <a:r>
-              <a:rPr lang="en-US" sz="2400" dirty="0">
-                <a:solidFill>
-                  <a:srgbClr val="0000FF"/>
-                </a:solidFill>
-                <a:latin typeface="Consolas, "/>
-              </a:rPr>
-              <a:t>const</a:t>
-            </a:r>
-            <a:r>
-              <a:rPr lang="en-US" sz="2400" dirty="0">
-                <a:solidFill>
-                  <a:srgbClr val="000000"/>
-                </a:solidFill>
-                <a:latin typeface="Consolas, "/>
-              </a:rPr>
-              <a:t> </a:t>
-            </a:r>
-            <a:r>
-              <a:rPr lang="en-US" sz="2400" dirty="0" err="1">
-                <a:solidFill>
-                  <a:srgbClr val="000000"/>
-                </a:solidFill>
-                <a:latin typeface="Consolas, "/>
-              </a:rPr>
-              <a:t>my_racc_iterator</a:t>
+              <a:t>my_random_access_iterator</a:t>
             </a:r>
             <a:r>
               <a:rPr lang="en-US" sz="2400" dirty="0">
@@ -23127,7 +23352,7 @@
                 </a:solidFill>
                 <a:latin typeface="Consolas, "/>
               </a:rPr>
-              <a:t>// Shows 5</a:t>
+              <a:t>// Prints 5</a:t>
             </a:r>
             <a:endParaRPr lang="en-US" sz="2400" dirty="0">
               <a:solidFill>
@@ -23162,7 +23387,7 @@
                 </a:solidFill>
                 <a:latin typeface="Consolas, "/>
               </a:rPr>
-              <a:t>// Remove 5 from the container</a:t>
+              <a:t>// Removes 5 from the container</a:t>
             </a:r>
             <a:endParaRPr lang="en-US" sz="2400" dirty="0">
               <a:solidFill>

</xml_diff>

<commit_message>
The iterators lecture minor improvements (#20)
</commit_message>
<xml_diff>
--- a/08_iterators/08_iterators.pptx
+++ b/08_iterators/08_iterators.pptx
@@ -26,7 +26,7 @@
     <p:sldId id="606" r:id="rId17"/>
     <p:sldId id="607" r:id="rId18"/>
     <p:sldId id="608" r:id="rId19"/>
-    <p:sldId id="609" r:id="rId20"/>
+    <p:sldId id="621" r:id="rId20"/>
     <p:sldId id="610" r:id="rId21"/>
     <p:sldId id="611" r:id="rId22"/>
     <p:sldId id="612" r:id="rId23"/>
@@ -223,7 +223,7 @@
           <a:p>
             <a:fld id="{5BD5B299-94C6-402B-8FE2-93C183F604B2}" type="datetimeFigureOut">
               <a:rPr lang="en-US" smtClean="0"/>
-              <a:t>12/29/2020</a:t>
+              <a:t>7/6/2021</a:t>
             </a:fld>
             <a:endParaRPr lang="en-US"/>
           </a:p>
@@ -1414,7 +1414,7 @@
     </p:spTree>
     <p:extLst>
       <p:ext uri="{BB962C8B-B14F-4D97-AF65-F5344CB8AC3E}">
-        <p14:creationId xmlns:p14="http://schemas.microsoft.com/office/powerpoint/2010/main" val="1466999128"/>
+        <p14:creationId xmlns:p14="http://schemas.microsoft.com/office/powerpoint/2010/main" val="1514218805"/>
       </p:ext>
     </p:extLst>
   </p:cSld>
@@ -2931,7 +2931,7 @@
           <a:p>
             <a:fld id="{947EF2C3-E71D-4F8D-9558-45572174E304}" type="datetimeFigureOut">
               <a:rPr lang="en-US" smtClean="0"/>
-              <a:t>12/29/2020</a:t>
+              <a:t>7/6/2021</a:t>
             </a:fld>
             <a:endParaRPr lang="en-US"/>
           </a:p>
@@ -3129,7 +3129,7 @@
           <a:p>
             <a:fld id="{947EF2C3-E71D-4F8D-9558-45572174E304}" type="datetimeFigureOut">
               <a:rPr lang="en-US" smtClean="0"/>
-              <a:t>12/29/2020</a:t>
+              <a:t>7/6/2021</a:t>
             </a:fld>
             <a:endParaRPr lang="en-US"/>
           </a:p>
@@ -3337,7 +3337,7 @@
           <a:p>
             <a:fld id="{947EF2C3-E71D-4F8D-9558-45572174E304}" type="datetimeFigureOut">
               <a:rPr lang="en-US" smtClean="0"/>
-              <a:t>12/29/2020</a:t>
+              <a:t>7/6/2021</a:t>
             </a:fld>
             <a:endParaRPr lang="en-US"/>
           </a:p>
@@ -3535,7 +3535,7 @@
           <a:p>
             <a:fld id="{947EF2C3-E71D-4F8D-9558-45572174E304}" type="datetimeFigureOut">
               <a:rPr lang="en-US" smtClean="0"/>
-              <a:t>12/29/2020</a:t>
+              <a:t>7/6/2021</a:t>
             </a:fld>
             <a:endParaRPr lang="en-US"/>
           </a:p>
@@ -3810,7 +3810,7 @@
           <a:p>
             <a:fld id="{947EF2C3-E71D-4F8D-9558-45572174E304}" type="datetimeFigureOut">
               <a:rPr lang="en-US" smtClean="0"/>
-              <a:t>12/29/2020</a:t>
+              <a:t>7/6/2021</a:t>
             </a:fld>
             <a:endParaRPr lang="en-US"/>
           </a:p>
@@ -4075,7 +4075,7 @@
           <a:p>
             <a:fld id="{947EF2C3-E71D-4F8D-9558-45572174E304}" type="datetimeFigureOut">
               <a:rPr lang="en-US" smtClean="0"/>
-              <a:t>12/29/2020</a:t>
+              <a:t>7/6/2021</a:t>
             </a:fld>
             <a:endParaRPr lang="en-US"/>
           </a:p>
@@ -4487,7 +4487,7 @@
           <a:p>
             <a:fld id="{947EF2C3-E71D-4F8D-9558-45572174E304}" type="datetimeFigureOut">
               <a:rPr lang="en-US" smtClean="0"/>
-              <a:t>12/29/2020</a:t>
+              <a:t>7/6/2021</a:t>
             </a:fld>
             <a:endParaRPr lang="en-US"/>
           </a:p>
@@ -4628,7 +4628,7 @@
           <a:p>
             <a:fld id="{947EF2C3-E71D-4F8D-9558-45572174E304}" type="datetimeFigureOut">
               <a:rPr lang="en-US" smtClean="0"/>
-              <a:t>12/29/2020</a:t>
+              <a:t>7/6/2021</a:t>
             </a:fld>
             <a:endParaRPr lang="en-US"/>
           </a:p>
@@ -4741,7 +4741,7 @@
           <a:p>
             <a:fld id="{947EF2C3-E71D-4F8D-9558-45572174E304}" type="datetimeFigureOut">
               <a:rPr lang="en-US" smtClean="0"/>
-              <a:t>12/29/2020</a:t>
+              <a:t>7/6/2021</a:t>
             </a:fld>
             <a:endParaRPr lang="en-US"/>
           </a:p>
@@ -5052,7 +5052,7 @@
           <a:p>
             <a:fld id="{947EF2C3-E71D-4F8D-9558-45572174E304}" type="datetimeFigureOut">
               <a:rPr lang="en-US" smtClean="0"/>
-              <a:t>12/29/2020</a:t>
+              <a:t>7/6/2021</a:t>
             </a:fld>
             <a:endParaRPr lang="en-US"/>
           </a:p>
@@ -5340,7 +5340,7 @@
           <a:p>
             <a:fld id="{947EF2C3-E71D-4F8D-9558-45572174E304}" type="datetimeFigureOut">
               <a:rPr lang="en-US" smtClean="0"/>
-              <a:t>12/29/2020</a:t>
+              <a:t>7/6/2021</a:t>
             </a:fld>
             <a:endParaRPr lang="en-US"/>
           </a:p>
@@ -5581,7 +5581,7 @@
           <a:p>
             <a:fld id="{947EF2C3-E71D-4F8D-9558-45572174E304}" type="datetimeFigureOut">
               <a:rPr lang="en-US" smtClean="0"/>
-              <a:t>12/29/2020</a:t>
+              <a:t>7/6/2021</a:t>
             </a:fld>
             <a:endParaRPr lang="en-US"/>
           </a:p>
@@ -6480,7 +6480,7 @@
           <a:lstStyle/>
           <a:p>
             <a:r>
-              <a:rPr lang="en-US" sz="7200"/>
+              <a:rPr lang="en-US" sz="7200" dirty="0"/>
               <a:t>Iterators overview</a:t>
             </a:r>
           </a:p>
@@ -7454,8 +7454,8 @@
           <a:prstGeom prst="straightConnector1">
             <a:avLst/>
           </a:prstGeom>
-          <a:ln>
-            <a:prstDash val="dash"/>
+          <a:ln w="19050">
+            <a:prstDash val="lgDashDot"/>
             <a:tailEnd type="triangle"/>
           </a:ln>
         </p:spPr>
@@ -7955,8 +7955,8 @@
         </p:nvSpPr>
         <p:spPr>
           <a:xfrm>
-            <a:off x="539749" y="1274309"/>
-            <a:ext cx="10290176" cy="4711624"/>
+            <a:off x="539749" y="1274308"/>
+            <a:ext cx="10290176" cy="5348913"/>
           </a:xfrm>
           <a:prstGeom prst="rect">
             <a:avLst/>
@@ -7964,7 +7964,7 @@
         </p:spPr>
         <p:txBody>
           <a:bodyPr>
-            <a:normAutofit/>
+            <a:normAutofit lnSpcReduction="10000"/>
           </a:bodyPr>
           <a:lstStyle>
             <a:lvl1pPr marL="0" indent="0" algn="l" defTabSz="457200" rtl="0" eaLnBrk="1" latinLnBrk="0" hangingPunct="1">
@@ -8135,11 +8135,25 @@
               <a:buChar char="•"/>
             </a:pPr>
             <a:r>
+              <a:rPr lang="en-US" sz="2533" i="1" dirty="0">
+                <a:ea typeface="Intel Clear Light" panose="020B0404020203020204" pitchFamily="34" charset="0"/>
+                <a:cs typeface="Intel Clear Light" panose="020B0404020203020204" pitchFamily="34" charset="0"/>
+              </a:rPr>
+              <a:t>==</a:t>
+            </a:r>
+            <a:r>
               <a:rPr lang="en-US" sz="2533" dirty="0">
                 <a:ea typeface="Intel Clear Light" panose="020B0404020203020204" pitchFamily="34" charset="0"/>
                 <a:cs typeface="Intel Clear Light" panose="020B0404020203020204" pitchFamily="34" charset="0"/>
               </a:rPr>
-              <a:t>== and !=</a:t>
+              <a:t> and </a:t>
+            </a:r>
+            <a:r>
+              <a:rPr lang="en-US" sz="2533" i="1" dirty="0">
+                <a:ea typeface="Intel Clear Light" panose="020B0404020203020204" pitchFamily="34" charset="0"/>
+                <a:cs typeface="Intel Clear Light" panose="020B0404020203020204" pitchFamily="34" charset="0"/>
+              </a:rPr>
+              <a:t>!=</a:t>
             </a:r>
           </a:p>
           <a:p>
@@ -8148,7 +8162,7 @@
               <a:buChar char="•"/>
             </a:pPr>
             <a:r>
-              <a:rPr lang="en-US" sz="2533" dirty="0">
+              <a:rPr lang="en-US" sz="2533" i="1" dirty="0">
                 <a:ea typeface="Intel Clear Light" panose="020B0404020203020204" pitchFamily="34" charset="0"/>
                 <a:cs typeface="Intel Clear Light" panose="020B0404020203020204" pitchFamily="34" charset="0"/>
               </a:rPr>
@@ -8161,7 +8175,7 @@
               <a:buChar char="•"/>
             </a:pPr>
             <a:r>
-              <a:rPr lang="en-US" sz="2533" dirty="0">
+              <a:rPr lang="en-US" sz="2533" i="1" dirty="0">
                 <a:ea typeface="Intel Clear Light" panose="020B0404020203020204" pitchFamily="34" charset="0"/>
                 <a:cs typeface="Intel Clear Light" panose="020B0404020203020204" pitchFamily="34" charset="0"/>
               </a:rPr>
@@ -8211,6 +8225,26 @@
           </a:p>
           <a:p>
             <a:endParaRPr lang="en-US" sz="2400" dirty="0">
+              <a:ea typeface="Intel Clear Light" panose="020B0404020203020204" pitchFamily="34" charset="0"/>
+              <a:cs typeface="Intel Clear Light" panose="020B0404020203020204" pitchFamily="34" charset="0"/>
+            </a:endParaRPr>
+          </a:p>
+          <a:p>
+            <a:r>
+              <a:rPr lang="en-US" sz="2800" dirty="0">
+                <a:ea typeface="Intel Clear Light" panose="020B0404020203020204" pitchFamily="34" charset="0"/>
+                <a:cs typeface="Intel Clear Light" panose="020B0404020203020204" pitchFamily="34" charset="0"/>
+              </a:rPr>
+              <a:t>Example - std::</a:t>
+            </a:r>
+            <a:r>
+              <a:rPr lang="en-US" sz="2800" dirty="0" err="1">
+                <a:ea typeface="Intel Clear Light" panose="020B0404020203020204" pitchFamily="34" charset="0"/>
+                <a:cs typeface="Intel Clear Light" panose="020B0404020203020204" pitchFamily="34" charset="0"/>
+              </a:rPr>
+              <a:t>istream_iterator</a:t>
+            </a:r>
+            <a:endParaRPr lang="en-US" sz="2800" dirty="0">
               <a:ea typeface="Intel Clear Light" panose="020B0404020203020204" pitchFamily="34" charset="0"/>
               <a:cs typeface="Intel Clear Light" panose="020B0404020203020204" pitchFamily="34" charset="0"/>
             </a:endParaRPr>
@@ -9650,7 +9684,7 @@
                 <a:ea typeface="Intel Clear Light" panose="020B0404020203020204" pitchFamily="34" charset="0"/>
                 <a:cs typeface="Intel Clear Light" panose="020B0404020203020204" pitchFamily="34" charset="0"/>
               </a:rPr>
-              <a:t>It--</a:t>
+              <a:t>it--</a:t>
             </a:r>
             <a:endParaRPr lang="en-US" sz="2533" dirty="0">
               <a:ea typeface="Intel Clear Light" panose="020B0404020203020204" pitchFamily="34" charset="0"/>
@@ -10578,7 +10612,7 @@
         <p:spPr>
           <a:xfrm>
             <a:off x="539749" y="1274310"/>
-            <a:ext cx="10594976" cy="4953495"/>
+            <a:ext cx="10594976" cy="5082040"/>
           </a:xfrm>
           <a:prstGeom prst="rect">
             <a:avLst/>
@@ -10586,7 +10620,7 @@
         </p:spPr>
         <p:txBody>
           <a:bodyPr>
-            <a:normAutofit/>
+            <a:normAutofit lnSpcReduction="10000"/>
           </a:bodyPr>
           <a:lstStyle>
             <a:lvl1pPr marL="0" indent="0" algn="l" defTabSz="457200" rtl="0" eaLnBrk="1" latinLnBrk="0" hangingPunct="1">
@@ -10814,7 +10848,7 @@
                 <a:ea typeface="Intel Clear Light" panose="020B0404020203020204" pitchFamily="34" charset="0"/>
                 <a:cs typeface="Intel Clear Light" panose="020B0404020203020204" pitchFamily="34" charset="0"/>
               </a:rPr>
-              <a:t>It[n]</a:t>
+              <a:t>it[n]</a:t>
             </a:r>
           </a:p>
           <a:p>
@@ -10877,22 +10911,28 @@
             </a:endParaRPr>
           </a:p>
           <a:p>
-            <a:endParaRPr lang="en-US" sz="2733" dirty="0">
-              <a:ea typeface="Intel Clear Light" panose="020B0404020203020204" pitchFamily="34" charset="0"/>
-              <a:cs typeface="Intel Clear Light" panose="020B0404020203020204" pitchFamily="34" charset="0"/>
-            </a:endParaRPr>
-          </a:p>
-          <a:p>
-            <a:pPr lvl="1" indent="0">
-              <a:buNone/>
-            </a:pPr>
+            <a:r>
+              <a:rPr lang="en-US" sz="2400" dirty="0">
+                <a:ea typeface="Intel Clear Light" panose="020B0404020203020204" pitchFamily="34" charset="0"/>
+                <a:cs typeface="Intel Clear Light" panose="020B0404020203020204" pitchFamily="34" charset="0"/>
+              </a:rPr>
+              <a:t>Raw pointer is </a:t>
+            </a:r>
+            <a:r>
+              <a:rPr lang="en-US" sz="2400" dirty="0" err="1">
+                <a:ea typeface="Intel Clear Light" panose="020B0404020203020204" pitchFamily="34" charset="0"/>
+                <a:cs typeface="Intel Clear Light" panose="020B0404020203020204" pitchFamily="34" charset="0"/>
+              </a:rPr>
+              <a:t>RandomAccessIterator</a:t>
+            </a:r>
+            <a:r>
+              <a:rPr lang="en-US" sz="2400" dirty="0">
+                <a:ea typeface="Intel Clear Light" panose="020B0404020203020204" pitchFamily="34" charset="0"/>
+                <a:cs typeface="Intel Clear Light" panose="020B0404020203020204" pitchFamily="34" charset="0"/>
+              </a:rPr>
+              <a:t>.</a:t>
+            </a:r>
             <a:endParaRPr lang="ru-RU" sz="2533" i="1" dirty="0">
-              <a:ea typeface="Intel Clear Light" panose="020B0404020203020204" pitchFamily="34" charset="0"/>
-              <a:cs typeface="Intel Clear Light" panose="020B0404020203020204" pitchFamily="34" charset="0"/>
-            </a:endParaRPr>
-          </a:p>
-          <a:p>
-            <a:endParaRPr lang="en-US" sz="2400" dirty="0">
               <a:ea typeface="Intel Clear Light" panose="020B0404020203020204" pitchFamily="34" charset="0"/>
               <a:cs typeface="Intel Clear Light" panose="020B0404020203020204" pitchFamily="34" charset="0"/>
             </a:endParaRPr>
@@ -11796,8 +11836,8 @@
         </p:nvSpPr>
         <p:spPr>
           <a:xfrm>
-            <a:off x="539749" y="1274309"/>
-            <a:ext cx="8925984" cy="4711624"/>
+            <a:off x="539748" y="1274309"/>
+            <a:ext cx="10614283" cy="4711624"/>
           </a:xfrm>
           <a:prstGeom prst="rect">
             <a:avLst/>
@@ -12032,8 +12072,9 @@
             </a:r>
           </a:p>
           <a:p>
-            <a:pPr lvl="1" indent="0">
-              <a:buNone/>
+            <a:pPr marL="757748" lvl="1" indent="-457189">
+              <a:buFont typeface="Arial" panose="020B0604020202020204" pitchFamily="34" charset="0"/>
+              <a:buChar char="•"/>
             </a:pPr>
             <a:endParaRPr lang="en-US" sz="2533" dirty="0">
               <a:ea typeface="Intel Clear Light" panose="020B0404020203020204" pitchFamily="34" charset="0"/>
@@ -12041,15 +12082,50 @@
             </a:endParaRPr>
           </a:p>
           <a:p>
-            <a:pPr lvl="1" indent="0">
+            <a:pPr marL="300559" lvl="1" indent="0">
               <a:buNone/>
             </a:pPr>
-            <a:endParaRPr lang="ru-RU" sz="2533" i="1" dirty="0">
-              <a:ea typeface="Intel Clear Light" panose="020B0404020203020204" pitchFamily="34" charset="0"/>
-              <a:cs typeface="Intel Clear Light" panose="020B0404020203020204" pitchFamily="34" charset="0"/>
-            </a:endParaRPr>
-          </a:p>
-          <a:p>
+            <a:r>
+              <a:rPr lang="en-US" sz="2533" dirty="0">
+                <a:ea typeface="Intel Clear Light" panose="020B0404020203020204" pitchFamily="34" charset="0"/>
+                <a:cs typeface="Intel Clear Light" panose="020B0404020203020204" pitchFamily="34" charset="0"/>
+              </a:rPr>
+              <a:t>Notes:</a:t>
+            </a:r>
+          </a:p>
+          <a:p>
+            <a:pPr marL="757759" lvl="1" indent="-457200"/>
+            <a:r>
+              <a:rPr lang="en-US" sz="2533" i="1" dirty="0">
+                <a:ea typeface="Intel Clear Light" panose="020B0404020203020204" pitchFamily="34" charset="0"/>
+                <a:cs typeface="Intel Clear Light" panose="020B0404020203020204" pitchFamily="34" charset="0"/>
+              </a:rPr>
+              <a:t>*it = obj </a:t>
+            </a:r>
+            <a:r>
+              <a:rPr lang="en-US" sz="2533" dirty="0">
+                <a:ea typeface="Intel Clear Light" panose="020B0404020203020204" pitchFamily="34" charset="0"/>
+                <a:cs typeface="Intel Clear Light" panose="020B0404020203020204" pitchFamily="34" charset="0"/>
+              </a:rPr>
+              <a:t>might invalidate the iterator object and all its copies</a:t>
+            </a:r>
+          </a:p>
+          <a:p>
+            <a:pPr marL="757759" lvl="1" indent="-457200"/>
+            <a:r>
+              <a:rPr lang="en-US" sz="2533" i="1" dirty="0">
+                <a:ea typeface="Intel Clear Light" panose="020B0404020203020204" pitchFamily="34" charset="0"/>
+                <a:cs typeface="Intel Clear Light" panose="020B0404020203020204" pitchFamily="34" charset="0"/>
+              </a:rPr>
+              <a:t>++it </a:t>
+            </a:r>
+            <a:r>
+              <a:rPr lang="en-US" sz="2533" dirty="0">
+                <a:ea typeface="Intel Clear Light" panose="020B0404020203020204" pitchFamily="34" charset="0"/>
+                <a:cs typeface="Intel Clear Light" panose="020B0404020203020204" pitchFamily="34" charset="0"/>
+              </a:rPr>
+              <a:t>might invalidate all copies of the iterator object</a:t>
+            </a:r>
             <a:endParaRPr lang="en-US" sz="2400" dirty="0">
               <a:ea typeface="Intel Clear Light" panose="020B0404020203020204" pitchFamily="34" charset="0"/>
               <a:cs typeface="Intel Clear Light" panose="020B0404020203020204" pitchFamily="34" charset="0"/>
@@ -12367,7 +12443,16 @@
                 </a:solidFill>
                 <a:latin typeface="Consolas, "/>
               </a:rPr>
-              <a:t>InputIt,</a:t>
+              <a:t>InputIt</a:t>
+            </a:r>
+            <a:r>
+              <a:rPr lang="en-US" sz="2400" dirty="0">
+                <a:solidFill>
+                  <a:srgbClr val="000000"/>
+                </a:solidFill>
+                <a:latin typeface="Consolas, "/>
+              </a:rPr>
+              <a:t>, </a:t>
             </a:r>
             <a:r>
               <a:rPr lang="en-US" sz="2400" dirty="0" err="1">
@@ -12633,7 +12718,7 @@
         <p:spPr>
           <a:xfrm>
             <a:off x="539749" y="1274310"/>
-            <a:ext cx="11187431" cy="4421641"/>
+            <a:ext cx="11187431" cy="4912306"/>
           </a:xfrm>
           <a:prstGeom prst="rect">
             <a:avLst/>
@@ -12827,7 +12912,16 @@
                 </a:solidFill>
                 <a:latin typeface="Consolas, "/>
               </a:rPr>
-              <a:t>InputIt,</a:t>
+              <a:t>InputIt</a:t>
+            </a:r>
+            <a:r>
+              <a:rPr lang="en-US" sz="2400" dirty="0">
+                <a:solidFill>
+                  <a:srgbClr val="000000"/>
+                </a:solidFill>
+                <a:latin typeface="Consolas, "/>
+              </a:rPr>
+              <a:t>, </a:t>
             </a:r>
             <a:r>
               <a:rPr lang="en-US" sz="2400" dirty="0" err="1">
@@ -12955,10 +13049,8 @@
                 </a:solidFill>
                 <a:latin typeface="Consolas, "/>
               </a:rPr>
-              <a:t> );</a:t>
-            </a:r>
-          </a:p>
-          <a:p>
+              <a:t> ) {</a:t>
+            </a:r>
             <a:br>
               <a:rPr lang="en-US" sz="2400" dirty="0">
                 <a:solidFill>
@@ -12970,6 +13062,15 @@
             <a:r>
               <a:rPr lang="en-US" sz="2400" dirty="0">
                 <a:solidFill>
+                  <a:srgbClr val="000000"/>
+                </a:solidFill>
+                <a:latin typeface="Consolas, "/>
+              </a:rPr>
+              <a:t>    </a:t>
+            </a:r>
+            <a:r>
+              <a:rPr lang="en-US" sz="2400" dirty="0">
+                <a:solidFill>
                   <a:srgbClr val="0000FF"/>
                 </a:solidFill>
                 <a:latin typeface="Consolas, "/>
@@ -12994,7 +13095,7 @@
                 </a:solidFill>
                 <a:latin typeface="Consolas, "/>
               </a:rPr>
-              <a:t>    *</a:t>
+              <a:t>        *</a:t>
             </a:r>
             <a:r>
               <a:rPr lang="en-US" sz="2400" dirty="0" err="1">
@@ -13023,18 +13124,58 @@
                 </a:solidFill>
                 <a:latin typeface="Consolas, "/>
               </a:rPr>
-              <a:t>    ++first;</a:t>
-            </a:r>
-          </a:p>
-          <a:p>
-            <a:r>
-              <a:rPr lang="en-US" sz="2400" dirty="0">
-                <a:solidFill>
-                  <a:srgbClr val="000000"/>
-                </a:solidFill>
-                <a:latin typeface="Consolas, "/>
-              </a:rPr>
-              <a:t>    ++</a:t>
+              <a:t>        ++first;</a:t>
+            </a:r>
+          </a:p>
+          <a:p>
+            <a:r>
+              <a:rPr lang="en-US" sz="2400" dirty="0">
+                <a:solidFill>
+                  <a:srgbClr val="000000"/>
+                </a:solidFill>
+                <a:latin typeface="Consolas, "/>
+              </a:rPr>
+              <a:t>        ++</a:t>
+            </a:r>
+            <a:r>
+              <a:rPr lang="en-US" sz="2400" dirty="0" err="1">
+                <a:solidFill>
+                  <a:srgbClr val="000000"/>
+                </a:solidFill>
+                <a:latin typeface="Consolas, "/>
+              </a:rPr>
+              <a:t>d_first</a:t>
+            </a:r>
+            <a:r>
+              <a:rPr lang="en-US" sz="2400" dirty="0">
+                <a:solidFill>
+                  <a:srgbClr val="000000"/>
+                </a:solidFill>
+                <a:latin typeface="Consolas, "/>
+              </a:rPr>
+              <a:t>;</a:t>
+            </a:r>
+          </a:p>
+          <a:p>
+            <a:r>
+              <a:rPr lang="en-US" sz="2400" dirty="0">
+                <a:solidFill>
+                  <a:srgbClr val="000000"/>
+                </a:solidFill>
+                <a:latin typeface="Consolas, "/>
+              </a:rPr>
+              <a:t>    }</a:t>
+            </a:r>
+          </a:p>
+          <a:p>
+            <a:r>
+              <a:rPr lang="en-US" sz="2400" dirty="0">
+                <a:solidFill>
+                  <a:srgbClr val="000000"/>
+                </a:solidFill>
+                <a:latin typeface="Consolas, "/>
+              </a:rPr>
+              <a:t>    return </a:t>
             </a:r>
             <a:r>
               <a:rPr lang="en-US" sz="2400" dirty="0" err="1">
@@ -13088,7 +13229,7 @@
     </p:spTree>
     <p:extLst>
       <p:ext uri="{BB962C8B-B14F-4D97-AF65-F5344CB8AC3E}">
-        <p14:creationId xmlns:p14="http://schemas.microsoft.com/office/powerpoint/2010/main" val="1966727688"/>
+        <p14:creationId xmlns:p14="http://schemas.microsoft.com/office/powerpoint/2010/main" val="1116196476"/>
       </p:ext>
     </p:extLst>
   </p:cSld>
@@ -13299,7 +13440,7 @@
                 <a:ea typeface="Intel Clear Light" panose="020B0404020203020204" pitchFamily="34" charset="0"/>
                 <a:cs typeface="Intel Clear Light" panose="020B0404020203020204" pitchFamily="34" charset="0"/>
               </a:rPr>
-              <a:t>Sequences</a:t>
+              <a:t>Sequence</a:t>
             </a:r>
           </a:p>
           <a:p>
@@ -14108,7 +14249,7 @@
                 </a:solidFill>
                 <a:latin typeface="Consolas, "/>
               </a:rPr>
-              <a:t>auto</a:t>
+              <a:t>int</a:t>
             </a:r>
             <a:r>
               <a:rPr lang="en-US" sz="2667" dirty="0">
@@ -14117,7 +14258,7 @@
                 </a:solidFill>
                 <a:latin typeface="Consolas, "/>
               </a:rPr>
-              <a:t> item : v) {</a:t>
+              <a:t> item : v ) {</a:t>
             </a:r>
           </a:p>
           <a:p>
@@ -14579,6 +14720,71 @@
                 </a:solidFill>
                 <a:latin typeface="Consolas, "/>
               </a:rPr>
+              <a:t>int</a:t>
+            </a:r>
+            <a:r>
+              <a:rPr lang="en-US" sz="1867" dirty="0">
+                <a:solidFill>
+                  <a:srgbClr val="000000"/>
+                </a:solidFill>
+                <a:latin typeface="Consolas, "/>
+              </a:rPr>
+              <a:t> </a:t>
+            </a:r>
+            <a:r>
+              <a:rPr lang="en-US" sz="1867" dirty="0" err="1">
+                <a:solidFill>
+                  <a:srgbClr val="000000"/>
+                </a:solidFill>
+                <a:latin typeface="Consolas, "/>
+              </a:rPr>
+              <a:t>i</a:t>
+            </a:r>
+            <a:r>
+              <a:rPr lang="en-US" sz="1867" dirty="0">
+                <a:solidFill>
+                  <a:srgbClr val="000000"/>
+                </a:solidFill>
+                <a:latin typeface="Consolas, "/>
+              </a:rPr>
+              <a:t> : v ) </a:t>
+            </a:r>
+            <a:r>
+              <a:rPr lang="en-US" sz="1867" dirty="0">
+                <a:solidFill>
+                  <a:srgbClr val="008000"/>
+                </a:solidFill>
+                <a:latin typeface="Consolas, "/>
+              </a:rPr>
+              <a:t>// Access by value</a:t>
+            </a:r>
+          </a:p>
+          <a:p>
+            <a:r>
+              <a:rPr lang="en-US" sz="1867" dirty="0">
+                <a:solidFill>
+                  <a:srgbClr val="0000FF"/>
+                </a:solidFill>
+                <a:latin typeface="Consolas, "/>
+              </a:rPr>
+              <a:t>for</a:t>
+            </a:r>
+            <a:r>
+              <a:rPr lang="en-US" sz="1867" dirty="0">
+                <a:solidFill>
+                  <a:srgbClr val="000000"/>
+                </a:solidFill>
+                <a:latin typeface="Consolas, "/>
+              </a:rPr>
+              <a:t> ( </a:t>
+            </a:r>
+            <a:r>
+              <a:rPr lang="en-US" sz="1867" dirty="0">
+                <a:solidFill>
+                  <a:srgbClr val="0000FF"/>
+                </a:solidFill>
+                <a:latin typeface="Consolas, "/>
+              </a:rPr>
               <a:t>auto</a:t>
             </a:r>
             <a:r>
@@ -14821,8 +15027,11 @@
             </a:endParaRPr>
           </a:p>
           <a:p>
-            <a:endParaRPr lang="en-US" sz="2533" i="1" dirty="0">
-              <a:latin typeface="Intel Clear Light" panose="020B0404020203020204" pitchFamily="34" charset="0"/>
+            <a:endParaRPr lang="en-US" sz="1867" i="1" dirty="0">
+              <a:solidFill>
+                <a:srgbClr val="000000"/>
+              </a:solidFill>
+              <a:latin typeface="Consolas, "/>
               <a:ea typeface="Intel Clear Light" panose="020B0404020203020204" pitchFamily="34" charset="0"/>
               <a:cs typeface="Intel Clear Light" panose="020B0404020203020204" pitchFamily="34" charset="0"/>
             </a:endParaRPr>
@@ -18562,7 +18771,7 @@
                 </a:solidFill>
                 <a:latin typeface="Consolas, "/>
               </a:rPr>
-              <a:t>// Also operators &gt;, &lt;=, &gt;=</a:t>
+              <a:t>// Also, operators &gt;, &lt;=, &gt;=</a:t>
             </a:r>
             <a:endParaRPr lang="en-US" sz="2400" dirty="0">
               <a:solidFill>
@@ -18810,7 +19019,7 @@
                 <a:ea typeface="Intel Clear Light" panose="020B0404020203020204" pitchFamily="34" charset="0"/>
                 <a:cs typeface="Intel Clear Light" panose="020B0404020203020204" pitchFamily="34" charset="0"/>
               </a:rPr>
-              <a:t>Sequences</a:t>
+              <a:t>Sequence</a:t>
             </a:r>
           </a:p>
           <a:p>
@@ -22788,7 +22997,7 @@
                 <a:ea typeface="Intel Clear Pro Bold" panose="020B0804020202060201" pitchFamily="34" charset="-52"/>
                 <a:cs typeface="Intel Clear Pro Bold" panose="020B0804020202060201" pitchFamily="34" charset="-52"/>
               </a:rPr>
-              <a:t>Dereferenceable and not dereferenceable iterators</a:t>
+              <a:t>Dereferenceable and non dereferenceable iterators</a:t>
             </a:r>
           </a:p>
         </p:txBody>
@@ -23449,7 +23658,7 @@
                 </a:solidFill>
                 <a:latin typeface="Consolas, "/>
               </a:rPr>
-              <a:t>// It was invalidated</a:t>
+              <a:t>// it was invalidated</a:t>
             </a:r>
             <a:endParaRPr lang="en-US" sz="2400" dirty="0">
               <a:solidFill>

</xml_diff>